<commit_message>
Committing version 1.0 of the Slide Deck
</commit_message>
<xml_diff>
--- a/docs/Blockchain workshop v0.1.pptx
+++ b/docs/Blockchain workshop v0.1.pptx
@@ -6,7 +6,7 @@
     <p:sldMasterId id="2147483661" r:id="rId2"/>
   </p:sldMasterIdLst>
   <p:notesMasterIdLst>
-    <p:notesMasterId r:id="rId39"/>
+    <p:notesMasterId r:id="rId44"/>
   </p:notesMasterIdLst>
   <p:sldIdLst>
     <p:sldId id="256" r:id="rId3"/>
@@ -45,6 +45,11 @@
     <p:sldId id="317" r:id="rId36"/>
     <p:sldId id="318" r:id="rId37"/>
     <p:sldId id="319" r:id="rId38"/>
+    <p:sldId id="320" r:id="rId39"/>
+    <p:sldId id="321" r:id="rId40"/>
+    <p:sldId id="322" r:id="rId41"/>
+    <p:sldId id="323" r:id="rId42"/>
+    <p:sldId id="324" r:id="rId43"/>
   </p:sldIdLst>
   <p:sldSz cx="12192000" cy="6858000"/>
   <p:notesSz cx="7104063" cy="10234613"/>
@@ -12242,6 +12247,690 @@
 </p:notes>
 </file>
 
+<file path=ppt/notesSlides/notesSlide37.xml><?xml version="1.0" encoding="utf-8"?>
+<p:notes xmlns:a="http://schemas.openxmlformats.org/drawingml/2006/main" xmlns:r="http://schemas.openxmlformats.org/officeDocument/2006/relationships" xmlns:p="http://schemas.openxmlformats.org/presentationml/2006/main">
+  <p:cSld>
+    <p:spTree>
+      <p:nvGrpSpPr>
+        <p:cNvPr id="1" name=""/>
+        <p:cNvGrpSpPr/>
+        <p:nvPr/>
+      </p:nvGrpSpPr>
+      <p:grpSpPr>
+        <a:xfrm>
+          <a:off x="0" y="0"/>
+          <a:ext cx="0" cy="0"/>
+          <a:chOff x="0" y="0"/>
+          <a:chExt cx="0" cy="0"/>
+        </a:xfrm>
+      </p:grpSpPr>
+      <p:sp>
+        <p:nvSpPr>
+          <p:cNvPr id="213" name="PlaceHolder 1"/>
+          <p:cNvSpPr>
+            <a:spLocks noGrp="1"/>
+          </p:cNvSpPr>
+          <p:nvPr>
+            <p:ph type="body"/>
+          </p:nvPr>
+        </p:nvSpPr>
+        <p:spPr>
+          <a:xfrm>
+            <a:off x="710280" y="4573080"/>
+            <a:ext cx="5677920" cy="4833720"/>
+          </a:xfrm>
+          <a:prstGeom prst="rect">
+            <a:avLst/>
+          </a:prstGeom>
+        </p:spPr>
+        <p:txBody>
+          <a:bodyPr lIns="99000" tIns="49680" rIns="99000" bIns="49680"/>
+          <a:lstStyle/>
+          <a:p>
+            <a:endParaRPr dirty="0"/>
+          </a:p>
+        </p:txBody>
+      </p:sp>
+      <p:sp>
+        <p:nvSpPr>
+          <p:cNvPr id="214" name="TextShape 2"/>
+          <p:cNvSpPr txBox="1"/>
+          <p:nvPr/>
+        </p:nvSpPr>
+        <p:spPr>
+          <a:xfrm>
+            <a:off x="710280" y="9525240"/>
+            <a:ext cx="2367720" cy="447840"/>
+          </a:xfrm>
+          <a:prstGeom prst="rect">
+            <a:avLst/>
+          </a:prstGeom>
+        </p:spPr>
+        <p:txBody>
+          <a:bodyPr lIns="99000" tIns="49680" rIns="99000" bIns="49680" anchor="b"/>
+          <a:lstStyle/>
+          <a:p>
+            <a:pPr>
+              <a:lnSpc>
+                <a:spcPct val="100000"/>
+              </a:lnSpc>
+            </a:pPr>
+            <a:r>
+              <a:rPr lang="en-IN" sz="1000">
+                <a:solidFill>
+                  <a:srgbClr val="000000"/>
+                </a:solidFill>
+                <a:latin typeface="Georgia"/>
+                <a:ea typeface="+mn-ea"/>
+              </a:rPr>
+              <a:t>Python for Tool Developers</a:t>
+            </a:r>
+            <a:endParaRPr/>
+          </a:p>
+        </p:txBody>
+      </p:sp>
+      <p:sp>
+        <p:nvSpPr>
+          <p:cNvPr id="215" name="TextShape 3"/>
+          <p:cNvSpPr txBox="1"/>
+          <p:nvPr/>
+        </p:nvSpPr>
+        <p:spPr>
+          <a:xfrm>
+            <a:off x="4024080" y="9525240"/>
+            <a:ext cx="2369160" cy="447840"/>
+          </a:xfrm>
+          <a:prstGeom prst="rect">
+            <a:avLst/>
+          </a:prstGeom>
+        </p:spPr>
+        <p:txBody>
+          <a:bodyPr lIns="99000" tIns="49680" rIns="99000" bIns="49680" anchor="b"/>
+          <a:lstStyle/>
+          <a:p>
+            <a:pPr algn="r">
+              <a:lnSpc>
+                <a:spcPct val="100000"/>
+              </a:lnSpc>
+            </a:pPr>
+            <a:fld id="{35246391-4904-47CA-9D44-D2369298080C}" type="slidenum">
+              <a:rPr lang="en-IN" sz="1000">
+                <a:solidFill>
+                  <a:srgbClr val="000000"/>
+                </a:solidFill>
+                <a:latin typeface="Georgia"/>
+                <a:ea typeface="+mn-ea"/>
+              </a:rPr>
+              <a:t>37</a:t>
+            </a:fld>
+            <a:endParaRPr/>
+          </a:p>
+        </p:txBody>
+      </p:sp>
+    </p:spTree>
+  </p:cSld>
+  <p:clrMapOvr>
+    <a:masterClrMapping/>
+  </p:clrMapOvr>
+</p:notes>
+</file>
+
+<file path=ppt/notesSlides/notesSlide38.xml><?xml version="1.0" encoding="utf-8"?>
+<p:notes xmlns:a="http://schemas.openxmlformats.org/drawingml/2006/main" xmlns:r="http://schemas.openxmlformats.org/officeDocument/2006/relationships" xmlns:p="http://schemas.openxmlformats.org/presentationml/2006/main">
+  <p:cSld>
+    <p:spTree>
+      <p:nvGrpSpPr>
+        <p:cNvPr id="1" name=""/>
+        <p:cNvGrpSpPr/>
+        <p:nvPr/>
+      </p:nvGrpSpPr>
+      <p:grpSpPr>
+        <a:xfrm>
+          <a:off x="0" y="0"/>
+          <a:ext cx="0" cy="0"/>
+          <a:chOff x="0" y="0"/>
+          <a:chExt cx="0" cy="0"/>
+        </a:xfrm>
+      </p:grpSpPr>
+      <p:sp>
+        <p:nvSpPr>
+          <p:cNvPr id="226" name="PlaceHolder 1"/>
+          <p:cNvSpPr>
+            <a:spLocks noGrp="1"/>
+          </p:cNvSpPr>
+          <p:nvPr>
+            <p:ph type="body"/>
+          </p:nvPr>
+        </p:nvSpPr>
+        <p:spPr>
+          <a:xfrm>
+            <a:off x="710280" y="4573080"/>
+            <a:ext cx="5677920" cy="4833720"/>
+          </a:xfrm>
+          <a:prstGeom prst="rect">
+            <a:avLst/>
+          </a:prstGeom>
+        </p:spPr>
+        <p:txBody>
+          <a:bodyPr lIns="99000" tIns="49680" rIns="99000" bIns="49680"/>
+          <a:lstStyle/>
+          <a:p>
+            <a:pPr marL="0" indent="0">
+              <a:lnSpc>
+                <a:spcPct val="100000"/>
+              </a:lnSpc>
+              <a:buNone/>
+            </a:pPr>
+            <a:endParaRPr lang="en-US" i="0" baseline="0" dirty="0" smtClean="0"/>
+          </a:p>
+          <a:p>
+            <a:pPr marL="0" indent="0">
+              <a:lnSpc>
+                <a:spcPct val="100000"/>
+              </a:lnSpc>
+              <a:buNone/>
+            </a:pPr>
+            <a:endParaRPr lang="en-US" i="0" baseline="0" dirty="0" smtClean="0"/>
+          </a:p>
+        </p:txBody>
+      </p:sp>
+      <p:sp>
+        <p:nvSpPr>
+          <p:cNvPr id="227" name="TextShape 2"/>
+          <p:cNvSpPr txBox="1"/>
+          <p:nvPr/>
+        </p:nvSpPr>
+        <p:spPr>
+          <a:xfrm>
+            <a:off x="710280" y="9525240"/>
+            <a:ext cx="2367720" cy="447840"/>
+          </a:xfrm>
+          <a:prstGeom prst="rect">
+            <a:avLst/>
+          </a:prstGeom>
+        </p:spPr>
+        <p:txBody>
+          <a:bodyPr lIns="99000" tIns="49680" rIns="99000" bIns="49680" anchor="b"/>
+          <a:lstStyle/>
+          <a:p>
+            <a:pPr>
+              <a:lnSpc>
+                <a:spcPct val="100000"/>
+              </a:lnSpc>
+            </a:pPr>
+            <a:r>
+              <a:rPr lang="en-IN" sz="1000">
+                <a:solidFill>
+                  <a:srgbClr val="000000"/>
+                </a:solidFill>
+                <a:latin typeface="Georgia"/>
+                <a:ea typeface="+mn-ea"/>
+              </a:rPr>
+              <a:t>Python for Tool Developers</a:t>
+            </a:r>
+            <a:endParaRPr/>
+          </a:p>
+        </p:txBody>
+      </p:sp>
+      <p:sp>
+        <p:nvSpPr>
+          <p:cNvPr id="228" name="TextShape 3"/>
+          <p:cNvSpPr txBox="1"/>
+          <p:nvPr/>
+        </p:nvSpPr>
+        <p:spPr>
+          <a:xfrm>
+            <a:off x="4024080" y="9525240"/>
+            <a:ext cx="2369160" cy="447840"/>
+          </a:xfrm>
+          <a:prstGeom prst="rect">
+            <a:avLst/>
+          </a:prstGeom>
+        </p:spPr>
+        <p:txBody>
+          <a:bodyPr lIns="99000" tIns="49680" rIns="99000" bIns="49680" anchor="b"/>
+          <a:lstStyle/>
+          <a:p>
+            <a:pPr algn="r">
+              <a:lnSpc>
+                <a:spcPct val="100000"/>
+              </a:lnSpc>
+            </a:pPr>
+            <a:fld id="{45C59338-27E2-485E-909A-A9DA2F4F3AF4}" type="slidenum">
+              <a:rPr lang="en-IN" sz="1000">
+                <a:solidFill>
+                  <a:srgbClr val="000000"/>
+                </a:solidFill>
+                <a:latin typeface="Georgia"/>
+                <a:ea typeface="+mn-ea"/>
+              </a:rPr>
+              <a:t>38</a:t>
+            </a:fld>
+            <a:endParaRPr/>
+          </a:p>
+        </p:txBody>
+      </p:sp>
+      <p:sp>
+        <p:nvSpPr>
+          <p:cNvPr id="229" name="CustomShape 4"/>
+          <p:cNvSpPr/>
+          <p:nvPr/>
+        </p:nvSpPr>
+        <p:spPr>
+          <a:xfrm>
+            <a:off x="1677240" y="6187320"/>
+            <a:ext cx="3744360" cy="1148760"/>
+          </a:xfrm>
+          <a:prstGeom prst="rect">
+            <a:avLst/>
+          </a:prstGeom>
+          <a:solidFill>
+            <a:srgbClr val="000000"/>
+          </a:solidFill>
+          <a:ln w="9360">
+            <a:solidFill>
+              <a:srgbClr val="328EA0"/>
+            </a:solidFill>
+            <a:round/>
+          </a:ln>
+        </p:spPr>
+        <p:txBody>
+          <a:bodyPr lIns="99000" tIns="49680" rIns="99000" bIns="49680" anchor="ctr"/>
+          <a:lstStyle/>
+          <a:p>
+            <a:pPr>
+              <a:lnSpc>
+                <a:spcPct val="100000"/>
+              </a:lnSpc>
+            </a:pPr>
+            <a:endParaRPr/>
+          </a:p>
+          <a:p>
+            <a:pPr>
+              <a:lnSpc>
+                <a:spcPct val="100000"/>
+              </a:lnSpc>
+            </a:pPr>
+            <a:r>
+              <a:rPr lang="en-IN" sz="1300">
+                <a:solidFill>
+                  <a:srgbClr val="000000"/>
+                </a:solidFill>
+                <a:latin typeface="Courier New"/>
+                <a:ea typeface="+mn-ea"/>
+              </a:rPr>
+              <a:t>def f(x,n):</a:t>
+            </a:r>
+            <a:endParaRPr/>
+          </a:p>
+          <a:p>
+            <a:pPr>
+              <a:lnSpc>
+                <a:spcPct val="100000"/>
+              </a:lnSpc>
+            </a:pPr>
+            <a:r>
+              <a:rPr lang="en-IN" sz="1300">
+                <a:solidFill>
+                  <a:srgbClr val="000000"/>
+                </a:solidFill>
+                <a:latin typeface="Courier New"/>
+                <a:ea typeface="+mn-ea"/>
+              </a:rPr>
+              <a:t>return(x+n)</a:t>
+            </a:r>
+            <a:endParaRPr/>
+          </a:p>
+          <a:p>
+            <a:pPr>
+              <a:lnSpc>
+                <a:spcPct val="100000"/>
+              </a:lnSpc>
+            </a:pPr>
+            <a:r>
+              <a:rPr lang="en-IN" sz="1300">
+                <a:solidFill>
+                  <a:srgbClr val="000000"/>
+                </a:solidFill>
+                <a:latin typeface="Courier New"/>
+                <a:ea typeface="+mn-ea"/>
+              </a:rPr>
+              <a:t>g = lambda x,n: x+n</a:t>
+            </a:r>
+            <a:endParaRPr/>
+          </a:p>
+          <a:p>
+            <a:pPr>
+              <a:lnSpc>
+                <a:spcPct val="100000"/>
+              </a:lnSpc>
+            </a:pPr>
+            <a:r>
+              <a:rPr lang="en-IN" sz="1300">
+                <a:solidFill>
+                  <a:srgbClr val="000000"/>
+                </a:solidFill>
+                <a:latin typeface="Courier New"/>
+                <a:ea typeface="+mn-ea"/>
+              </a:rPr>
+              <a:t>print (f(1,2))</a:t>
+            </a:r>
+            <a:endParaRPr/>
+          </a:p>
+          <a:p>
+            <a:pPr>
+              <a:lnSpc>
+                <a:spcPct val="100000"/>
+              </a:lnSpc>
+            </a:pPr>
+            <a:r>
+              <a:rPr lang="en-IN" sz="1300">
+                <a:solidFill>
+                  <a:srgbClr val="000000"/>
+                </a:solidFill>
+                <a:latin typeface="Courier New"/>
+                <a:ea typeface="+mn-ea"/>
+              </a:rPr>
+              <a:t>print (g(1,2))</a:t>
+            </a:r>
+            <a:endParaRPr/>
+          </a:p>
+          <a:p>
+            <a:pPr algn="ctr">
+              <a:lnSpc>
+                <a:spcPct val="100000"/>
+              </a:lnSpc>
+            </a:pPr>
+            <a:endParaRPr/>
+          </a:p>
+        </p:txBody>
+      </p:sp>
+    </p:spTree>
+  </p:cSld>
+  <p:clrMapOvr>
+    <a:masterClrMapping/>
+  </p:clrMapOvr>
+</p:notes>
+</file>
+
+<file path=ppt/notesSlides/notesSlide39.xml><?xml version="1.0" encoding="utf-8"?>
+<p:notes xmlns:a="http://schemas.openxmlformats.org/drawingml/2006/main" xmlns:r="http://schemas.openxmlformats.org/officeDocument/2006/relationships" xmlns:p="http://schemas.openxmlformats.org/presentationml/2006/main">
+  <p:cSld>
+    <p:spTree>
+      <p:nvGrpSpPr>
+        <p:cNvPr id="1" name=""/>
+        <p:cNvGrpSpPr/>
+        <p:nvPr/>
+      </p:nvGrpSpPr>
+      <p:grpSpPr>
+        <a:xfrm>
+          <a:off x="0" y="0"/>
+          <a:ext cx="0" cy="0"/>
+          <a:chOff x="0" y="0"/>
+          <a:chExt cx="0" cy="0"/>
+        </a:xfrm>
+      </p:grpSpPr>
+      <p:sp>
+        <p:nvSpPr>
+          <p:cNvPr id="226" name="PlaceHolder 1"/>
+          <p:cNvSpPr>
+            <a:spLocks noGrp="1"/>
+          </p:cNvSpPr>
+          <p:nvPr>
+            <p:ph type="body"/>
+          </p:nvPr>
+        </p:nvSpPr>
+        <p:spPr>
+          <a:xfrm>
+            <a:off x="710280" y="4573080"/>
+            <a:ext cx="5677920" cy="4833720"/>
+          </a:xfrm>
+          <a:prstGeom prst="rect">
+            <a:avLst/>
+          </a:prstGeom>
+        </p:spPr>
+        <p:txBody>
+          <a:bodyPr lIns="99000" tIns="49680" rIns="99000" bIns="49680"/>
+          <a:lstStyle/>
+          <a:p>
+            <a:pPr marL="0" indent="0">
+              <a:lnSpc>
+                <a:spcPct val="100000"/>
+              </a:lnSpc>
+              <a:buNone/>
+            </a:pPr>
+            <a:endParaRPr lang="en-US" i="0" baseline="0" dirty="0" smtClean="0"/>
+          </a:p>
+          <a:p>
+            <a:pPr marL="0" indent="0">
+              <a:lnSpc>
+                <a:spcPct val="100000"/>
+              </a:lnSpc>
+              <a:buNone/>
+            </a:pPr>
+            <a:endParaRPr lang="en-US" i="0" baseline="0" dirty="0" smtClean="0"/>
+          </a:p>
+        </p:txBody>
+      </p:sp>
+      <p:sp>
+        <p:nvSpPr>
+          <p:cNvPr id="227" name="TextShape 2"/>
+          <p:cNvSpPr txBox="1"/>
+          <p:nvPr/>
+        </p:nvSpPr>
+        <p:spPr>
+          <a:xfrm>
+            <a:off x="710280" y="9525240"/>
+            <a:ext cx="2367720" cy="447840"/>
+          </a:xfrm>
+          <a:prstGeom prst="rect">
+            <a:avLst/>
+          </a:prstGeom>
+        </p:spPr>
+        <p:txBody>
+          <a:bodyPr lIns="99000" tIns="49680" rIns="99000" bIns="49680" anchor="b"/>
+          <a:lstStyle/>
+          <a:p>
+            <a:pPr>
+              <a:lnSpc>
+                <a:spcPct val="100000"/>
+              </a:lnSpc>
+            </a:pPr>
+            <a:r>
+              <a:rPr lang="en-IN" sz="1000">
+                <a:solidFill>
+                  <a:srgbClr val="000000"/>
+                </a:solidFill>
+                <a:latin typeface="Georgia"/>
+                <a:ea typeface="+mn-ea"/>
+              </a:rPr>
+              <a:t>Python for Tool Developers</a:t>
+            </a:r>
+            <a:endParaRPr/>
+          </a:p>
+        </p:txBody>
+      </p:sp>
+      <p:sp>
+        <p:nvSpPr>
+          <p:cNvPr id="228" name="TextShape 3"/>
+          <p:cNvSpPr txBox="1"/>
+          <p:nvPr/>
+        </p:nvSpPr>
+        <p:spPr>
+          <a:xfrm>
+            <a:off x="4024080" y="9525240"/>
+            <a:ext cx="2369160" cy="447840"/>
+          </a:xfrm>
+          <a:prstGeom prst="rect">
+            <a:avLst/>
+          </a:prstGeom>
+        </p:spPr>
+        <p:txBody>
+          <a:bodyPr lIns="99000" tIns="49680" rIns="99000" bIns="49680" anchor="b"/>
+          <a:lstStyle/>
+          <a:p>
+            <a:pPr algn="r">
+              <a:lnSpc>
+                <a:spcPct val="100000"/>
+              </a:lnSpc>
+            </a:pPr>
+            <a:fld id="{45C59338-27E2-485E-909A-A9DA2F4F3AF4}" type="slidenum">
+              <a:rPr lang="en-IN" sz="1000">
+                <a:solidFill>
+                  <a:srgbClr val="000000"/>
+                </a:solidFill>
+                <a:latin typeface="Georgia"/>
+                <a:ea typeface="+mn-ea"/>
+              </a:rPr>
+              <a:t>39</a:t>
+            </a:fld>
+            <a:endParaRPr/>
+          </a:p>
+        </p:txBody>
+      </p:sp>
+      <p:sp>
+        <p:nvSpPr>
+          <p:cNvPr id="229" name="CustomShape 4"/>
+          <p:cNvSpPr/>
+          <p:nvPr/>
+        </p:nvSpPr>
+        <p:spPr>
+          <a:xfrm>
+            <a:off x="1677240" y="6187320"/>
+            <a:ext cx="3744360" cy="1148760"/>
+          </a:xfrm>
+          <a:prstGeom prst="rect">
+            <a:avLst/>
+          </a:prstGeom>
+          <a:solidFill>
+            <a:srgbClr val="000000"/>
+          </a:solidFill>
+          <a:ln w="9360">
+            <a:solidFill>
+              <a:srgbClr val="328EA0"/>
+            </a:solidFill>
+            <a:round/>
+          </a:ln>
+        </p:spPr>
+        <p:txBody>
+          <a:bodyPr lIns="99000" tIns="49680" rIns="99000" bIns="49680" anchor="ctr"/>
+          <a:lstStyle/>
+          <a:p>
+            <a:pPr>
+              <a:lnSpc>
+                <a:spcPct val="100000"/>
+              </a:lnSpc>
+            </a:pPr>
+            <a:endParaRPr/>
+          </a:p>
+          <a:p>
+            <a:pPr>
+              <a:lnSpc>
+                <a:spcPct val="100000"/>
+              </a:lnSpc>
+            </a:pPr>
+            <a:r>
+              <a:rPr lang="en-IN" sz="1300">
+                <a:solidFill>
+                  <a:srgbClr val="000000"/>
+                </a:solidFill>
+                <a:latin typeface="Courier New"/>
+                <a:ea typeface="+mn-ea"/>
+              </a:rPr>
+              <a:t>def f(x,n):</a:t>
+            </a:r>
+            <a:endParaRPr/>
+          </a:p>
+          <a:p>
+            <a:pPr>
+              <a:lnSpc>
+                <a:spcPct val="100000"/>
+              </a:lnSpc>
+            </a:pPr>
+            <a:r>
+              <a:rPr lang="en-IN" sz="1300">
+                <a:solidFill>
+                  <a:srgbClr val="000000"/>
+                </a:solidFill>
+                <a:latin typeface="Courier New"/>
+                <a:ea typeface="+mn-ea"/>
+              </a:rPr>
+              <a:t>return(x+n)</a:t>
+            </a:r>
+            <a:endParaRPr/>
+          </a:p>
+          <a:p>
+            <a:pPr>
+              <a:lnSpc>
+                <a:spcPct val="100000"/>
+              </a:lnSpc>
+            </a:pPr>
+            <a:r>
+              <a:rPr lang="en-IN" sz="1300">
+                <a:solidFill>
+                  <a:srgbClr val="000000"/>
+                </a:solidFill>
+                <a:latin typeface="Courier New"/>
+                <a:ea typeface="+mn-ea"/>
+              </a:rPr>
+              <a:t>g = lambda x,n: x+n</a:t>
+            </a:r>
+            <a:endParaRPr/>
+          </a:p>
+          <a:p>
+            <a:pPr>
+              <a:lnSpc>
+                <a:spcPct val="100000"/>
+              </a:lnSpc>
+            </a:pPr>
+            <a:r>
+              <a:rPr lang="en-IN" sz="1300">
+                <a:solidFill>
+                  <a:srgbClr val="000000"/>
+                </a:solidFill>
+                <a:latin typeface="Courier New"/>
+                <a:ea typeface="+mn-ea"/>
+              </a:rPr>
+              <a:t>print (f(1,2))</a:t>
+            </a:r>
+            <a:endParaRPr/>
+          </a:p>
+          <a:p>
+            <a:pPr>
+              <a:lnSpc>
+                <a:spcPct val="100000"/>
+              </a:lnSpc>
+            </a:pPr>
+            <a:r>
+              <a:rPr lang="en-IN" sz="1300">
+                <a:solidFill>
+                  <a:srgbClr val="000000"/>
+                </a:solidFill>
+                <a:latin typeface="Courier New"/>
+                <a:ea typeface="+mn-ea"/>
+              </a:rPr>
+              <a:t>print (g(1,2))</a:t>
+            </a:r>
+            <a:endParaRPr/>
+          </a:p>
+          <a:p>
+            <a:pPr algn="ctr">
+              <a:lnSpc>
+                <a:spcPct val="100000"/>
+              </a:lnSpc>
+            </a:pPr>
+            <a:endParaRPr/>
+          </a:p>
+        </p:txBody>
+      </p:sp>
+    </p:spTree>
+  </p:cSld>
+  <p:clrMapOvr>
+    <a:masterClrMapping/>
+  </p:clrMapOvr>
+</p:notes>
+</file>
+
 <file path=ppt/notesSlides/notesSlide4.xml><?xml version="1.0" encoding="utf-8"?>
 <p:notes xmlns:a="http://schemas.openxmlformats.org/drawingml/2006/main" xmlns:r="http://schemas.openxmlformats.org/officeDocument/2006/relationships" xmlns:p="http://schemas.openxmlformats.org/presentationml/2006/main">
   <p:cSld>
@@ -12877,6 +13566,562 @@
               </a:rPr>
               <a:t>newList = [number * number for number in OriginalList]</a:t>
             </a:r>
+            <a:endParaRPr/>
+          </a:p>
+        </p:txBody>
+      </p:sp>
+    </p:spTree>
+  </p:cSld>
+  <p:clrMapOvr>
+    <a:masterClrMapping/>
+  </p:clrMapOvr>
+</p:notes>
+</file>
+
+<file path=ppt/notesSlides/notesSlide40.xml><?xml version="1.0" encoding="utf-8"?>
+<p:notes xmlns:a="http://schemas.openxmlformats.org/drawingml/2006/main" xmlns:r="http://schemas.openxmlformats.org/officeDocument/2006/relationships" xmlns:p="http://schemas.openxmlformats.org/presentationml/2006/main">
+  <p:cSld>
+    <p:spTree>
+      <p:nvGrpSpPr>
+        <p:cNvPr id="1" name=""/>
+        <p:cNvGrpSpPr/>
+        <p:nvPr/>
+      </p:nvGrpSpPr>
+      <p:grpSpPr>
+        <a:xfrm>
+          <a:off x="0" y="0"/>
+          <a:ext cx="0" cy="0"/>
+          <a:chOff x="0" y="0"/>
+          <a:chExt cx="0" cy="0"/>
+        </a:xfrm>
+      </p:grpSpPr>
+      <p:sp>
+        <p:nvSpPr>
+          <p:cNvPr id="226" name="PlaceHolder 1"/>
+          <p:cNvSpPr>
+            <a:spLocks noGrp="1"/>
+          </p:cNvSpPr>
+          <p:nvPr>
+            <p:ph type="body"/>
+          </p:nvPr>
+        </p:nvSpPr>
+        <p:spPr>
+          <a:xfrm>
+            <a:off x="710280" y="4573080"/>
+            <a:ext cx="5677920" cy="4833720"/>
+          </a:xfrm>
+          <a:prstGeom prst="rect">
+            <a:avLst/>
+          </a:prstGeom>
+        </p:spPr>
+        <p:txBody>
+          <a:bodyPr lIns="99000" tIns="49680" rIns="99000" bIns="49680"/>
+          <a:lstStyle/>
+          <a:p>
+            <a:pPr marL="0" indent="0">
+              <a:lnSpc>
+                <a:spcPct val="100000"/>
+              </a:lnSpc>
+              <a:buNone/>
+            </a:pPr>
+            <a:endParaRPr lang="en-US" i="0" baseline="0" dirty="0" smtClean="0"/>
+          </a:p>
+          <a:p>
+            <a:pPr marL="0" indent="0">
+              <a:lnSpc>
+                <a:spcPct val="100000"/>
+              </a:lnSpc>
+              <a:buNone/>
+            </a:pPr>
+            <a:endParaRPr lang="en-US" i="0" baseline="0" dirty="0" smtClean="0"/>
+          </a:p>
+        </p:txBody>
+      </p:sp>
+      <p:sp>
+        <p:nvSpPr>
+          <p:cNvPr id="227" name="TextShape 2"/>
+          <p:cNvSpPr txBox="1"/>
+          <p:nvPr/>
+        </p:nvSpPr>
+        <p:spPr>
+          <a:xfrm>
+            <a:off x="710280" y="9525240"/>
+            <a:ext cx="2367720" cy="447840"/>
+          </a:xfrm>
+          <a:prstGeom prst="rect">
+            <a:avLst/>
+          </a:prstGeom>
+        </p:spPr>
+        <p:txBody>
+          <a:bodyPr lIns="99000" tIns="49680" rIns="99000" bIns="49680" anchor="b"/>
+          <a:lstStyle/>
+          <a:p>
+            <a:pPr>
+              <a:lnSpc>
+                <a:spcPct val="100000"/>
+              </a:lnSpc>
+            </a:pPr>
+            <a:r>
+              <a:rPr lang="en-IN" sz="1000">
+                <a:solidFill>
+                  <a:srgbClr val="000000"/>
+                </a:solidFill>
+                <a:latin typeface="Georgia"/>
+                <a:ea typeface="+mn-ea"/>
+              </a:rPr>
+              <a:t>Python for Tool Developers</a:t>
+            </a:r>
+            <a:endParaRPr/>
+          </a:p>
+        </p:txBody>
+      </p:sp>
+      <p:sp>
+        <p:nvSpPr>
+          <p:cNvPr id="228" name="TextShape 3"/>
+          <p:cNvSpPr txBox="1"/>
+          <p:nvPr/>
+        </p:nvSpPr>
+        <p:spPr>
+          <a:xfrm>
+            <a:off x="4024080" y="9525240"/>
+            <a:ext cx="2369160" cy="447840"/>
+          </a:xfrm>
+          <a:prstGeom prst="rect">
+            <a:avLst/>
+          </a:prstGeom>
+        </p:spPr>
+        <p:txBody>
+          <a:bodyPr lIns="99000" tIns="49680" rIns="99000" bIns="49680" anchor="b"/>
+          <a:lstStyle/>
+          <a:p>
+            <a:pPr algn="r">
+              <a:lnSpc>
+                <a:spcPct val="100000"/>
+              </a:lnSpc>
+            </a:pPr>
+            <a:fld id="{45C59338-27E2-485E-909A-A9DA2F4F3AF4}" type="slidenum">
+              <a:rPr lang="en-IN" sz="1000">
+                <a:solidFill>
+                  <a:srgbClr val="000000"/>
+                </a:solidFill>
+                <a:latin typeface="Georgia"/>
+                <a:ea typeface="+mn-ea"/>
+              </a:rPr>
+              <a:t>40</a:t>
+            </a:fld>
+            <a:endParaRPr/>
+          </a:p>
+        </p:txBody>
+      </p:sp>
+      <p:sp>
+        <p:nvSpPr>
+          <p:cNvPr id="229" name="CustomShape 4"/>
+          <p:cNvSpPr/>
+          <p:nvPr/>
+        </p:nvSpPr>
+        <p:spPr>
+          <a:xfrm>
+            <a:off x="1677240" y="6187320"/>
+            <a:ext cx="3744360" cy="1148760"/>
+          </a:xfrm>
+          <a:prstGeom prst="rect">
+            <a:avLst/>
+          </a:prstGeom>
+          <a:solidFill>
+            <a:srgbClr val="000000"/>
+          </a:solidFill>
+          <a:ln w="9360">
+            <a:solidFill>
+              <a:srgbClr val="328EA0"/>
+            </a:solidFill>
+            <a:round/>
+          </a:ln>
+        </p:spPr>
+        <p:txBody>
+          <a:bodyPr lIns="99000" tIns="49680" rIns="99000" bIns="49680" anchor="ctr"/>
+          <a:lstStyle/>
+          <a:p>
+            <a:pPr>
+              <a:lnSpc>
+                <a:spcPct val="100000"/>
+              </a:lnSpc>
+            </a:pPr>
+            <a:endParaRPr/>
+          </a:p>
+          <a:p>
+            <a:pPr>
+              <a:lnSpc>
+                <a:spcPct val="100000"/>
+              </a:lnSpc>
+            </a:pPr>
+            <a:r>
+              <a:rPr lang="en-IN" sz="1300">
+                <a:solidFill>
+                  <a:srgbClr val="000000"/>
+                </a:solidFill>
+                <a:latin typeface="Courier New"/>
+                <a:ea typeface="+mn-ea"/>
+              </a:rPr>
+              <a:t>def f(x,n):</a:t>
+            </a:r>
+            <a:endParaRPr/>
+          </a:p>
+          <a:p>
+            <a:pPr>
+              <a:lnSpc>
+                <a:spcPct val="100000"/>
+              </a:lnSpc>
+            </a:pPr>
+            <a:r>
+              <a:rPr lang="en-IN" sz="1300">
+                <a:solidFill>
+                  <a:srgbClr val="000000"/>
+                </a:solidFill>
+                <a:latin typeface="Courier New"/>
+                <a:ea typeface="+mn-ea"/>
+              </a:rPr>
+              <a:t>return(x+n)</a:t>
+            </a:r>
+            <a:endParaRPr/>
+          </a:p>
+          <a:p>
+            <a:pPr>
+              <a:lnSpc>
+                <a:spcPct val="100000"/>
+              </a:lnSpc>
+            </a:pPr>
+            <a:r>
+              <a:rPr lang="en-IN" sz="1300">
+                <a:solidFill>
+                  <a:srgbClr val="000000"/>
+                </a:solidFill>
+                <a:latin typeface="Courier New"/>
+                <a:ea typeface="+mn-ea"/>
+              </a:rPr>
+              <a:t>g = lambda x,n: x+n</a:t>
+            </a:r>
+            <a:endParaRPr/>
+          </a:p>
+          <a:p>
+            <a:pPr>
+              <a:lnSpc>
+                <a:spcPct val="100000"/>
+              </a:lnSpc>
+            </a:pPr>
+            <a:r>
+              <a:rPr lang="en-IN" sz="1300">
+                <a:solidFill>
+                  <a:srgbClr val="000000"/>
+                </a:solidFill>
+                <a:latin typeface="Courier New"/>
+                <a:ea typeface="+mn-ea"/>
+              </a:rPr>
+              <a:t>print (f(1,2))</a:t>
+            </a:r>
+            <a:endParaRPr/>
+          </a:p>
+          <a:p>
+            <a:pPr>
+              <a:lnSpc>
+                <a:spcPct val="100000"/>
+              </a:lnSpc>
+            </a:pPr>
+            <a:r>
+              <a:rPr lang="en-IN" sz="1300">
+                <a:solidFill>
+                  <a:srgbClr val="000000"/>
+                </a:solidFill>
+                <a:latin typeface="Courier New"/>
+                <a:ea typeface="+mn-ea"/>
+              </a:rPr>
+              <a:t>print (g(1,2))</a:t>
+            </a:r>
+            <a:endParaRPr/>
+          </a:p>
+          <a:p>
+            <a:pPr algn="ctr">
+              <a:lnSpc>
+                <a:spcPct val="100000"/>
+              </a:lnSpc>
+            </a:pPr>
+            <a:endParaRPr/>
+          </a:p>
+        </p:txBody>
+      </p:sp>
+    </p:spTree>
+  </p:cSld>
+  <p:clrMapOvr>
+    <a:masterClrMapping/>
+  </p:clrMapOvr>
+</p:notes>
+</file>
+
+<file path=ppt/notesSlides/notesSlide41.xml><?xml version="1.0" encoding="utf-8"?>
+<p:notes xmlns:a="http://schemas.openxmlformats.org/drawingml/2006/main" xmlns:r="http://schemas.openxmlformats.org/officeDocument/2006/relationships" xmlns:p="http://schemas.openxmlformats.org/presentationml/2006/main">
+  <p:cSld>
+    <p:spTree>
+      <p:nvGrpSpPr>
+        <p:cNvPr id="1" name=""/>
+        <p:cNvGrpSpPr/>
+        <p:nvPr/>
+      </p:nvGrpSpPr>
+      <p:grpSpPr>
+        <a:xfrm>
+          <a:off x="0" y="0"/>
+          <a:ext cx="0" cy="0"/>
+          <a:chOff x="0" y="0"/>
+          <a:chExt cx="0" cy="0"/>
+        </a:xfrm>
+      </p:grpSpPr>
+      <p:sp>
+        <p:nvSpPr>
+          <p:cNvPr id="226" name="PlaceHolder 1"/>
+          <p:cNvSpPr>
+            <a:spLocks noGrp="1"/>
+          </p:cNvSpPr>
+          <p:nvPr>
+            <p:ph type="body"/>
+          </p:nvPr>
+        </p:nvSpPr>
+        <p:spPr>
+          <a:xfrm>
+            <a:off x="710280" y="4573080"/>
+            <a:ext cx="5677920" cy="4833720"/>
+          </a:xfrm>
+          <a:prstGeom prst="rect">
+            <a:avLst/>
+          </a:prstGeom>
+        </p:spPr>
+        <p:txBody>
+          <a:bodyPr lIns="99000" tIns="49680" rIns="99000" bIns="49680"/>
+          <a:lstStyle/>
+          <a:p>
+            <a:pPr marL="0" indent="0">
+              <a:lnSpc>
+                <a:spcPct val="100000"/>
+              </a:lnSpc>
+              <a:buNone/>
+            </a:pPr>
+            <a:endParaRPr lang="en-US" i="0" baseline="0" dirty="0" smtClean="0"/>
+          </a:p>
+          <a:p>
+            <a:pPr marL="0" indent="0">
+              <a:lnSpc>
+                <a:spcPct val="100000"/>
+              </a:lnSpc>
+              <a:buNone/>
+            </a:pPr>
+            <a:endParaRPr lang="en-US" i="0" baseline="0" dirty="0" smtClean="0"/>
+          </a:p>
+        </p:txBody>
+      </p:sp>
+      <p:sp>
+        <p:nvSpPr>
+          <p:cNvPr id="227" name="TextShape 2"/>
+          <p:cNvSpPr txBox="1"/>
+          <p:nvPr/>
+        </p:nvSpPr>
+        <p:spPr>
+          <a:xfrm>
+            <a:off x="710280" y="9525240"/>
+            <a:ext cx="2367720" cy="447840"/>
+          </a:xfrm>
+          <a:prstGeom prst="rect">
+            <a:avLst/>
+          </a:prstGeom>
+        </p:spPr>
+        <p:txBody>
+          <a:bodyPr lIns="99000" tIns="49680" rIns="99000" bIns="49680" anchor="b"/>
+          <a:lstStyle/>
+          <a:p>
+            <a:pPr>
+              <a:lnSpc>
+                <a:spcPct val="100000"/>
+              </a:lnSpc>
+            </a:pPr>
+            <a:r>
+              <a:rPr lang="en-IN" sz="1000">
+                <a:solidFill>
+                  <a:srgbClr val="000000"/>
+                </a:solidFill>
+                <a:latin typeface="Georgia"/>
+                <a:ea typeface="+mn-ea"/>
+              </a:rPr>
+              <a:t>Python for Tool Developers</a:t>
+            </a:r>
+            <a:endParaRPr/>
+          </a:p>
+        </p:txBody>
+      </p:sp>
+      <p:sp>
+        <p:nvSpPr>
+          <p:cNvPr id="228" name="TextShape 3"/>
+          <p:cNvSpPr txBox="1"/>
+          <p:nvPr/>
+        </p:nvSpPr>
+        <p:spPr>
+          <a:xfrm>
+            <a:off x="4024080" y="9525240"/>
+            <a:ext cx="2369160" cy="447840"/>
+          </a:xfrm>
+          <a:prstGeom prst="rect">
+            <a:avLst/>
+          </a:prstGeom>
+        </p:spPr>
+        <p:txBody>
+          <a:bodyPr lIns="99000" tIns="49680" rIns="99000" bIns="49680" anchor="b"/>
+          <a:lstStyle/>
+          <a:p>
+            <a:pPr algn="r">
+              <a:lnSpc>
+                <a:spcPct val="100000"/>
+              </a:lnSpc>
+            </a:pPr>
+            <a:fld id="{45C59338-27E2-485E-909A-A9DA2F4F3AF4}" type="slidenum">
+              <a:rPr lang="en-IN" sz="1000">
+                <a:solidFill>
+                  <a:srgbClr val="000000"/>
+                </a:solidFill>
+                <a:latin typeface="Georgia"/>
+                <a:ea typeface="+mn-ea"/>
+              </a:rPr>
+              <a:t>41</a:t>
+            </a:fld>
+            <a:endParaRPr/>
+          </a:p>
+        </p:txBody>
+      </p:sp>
+      <p:sp>
+        <p:nvSpPr>
+          <p:cNvPr id="229" name="CustomShape 4"/>
+          <p:cNvSpPr/>
+          <p:nvPr/>
+        </p:nvSpPr>
+        <p:spPr>
+          <a:xfrm>
+            <a:off x="1677240" y="6187320"/>
+            <a:ext cx="3744360" cy="1148760"/>
+          </a:xfrm>
+          <a:prstGeom prst="rect">
+            <a:avLst/>
+          </a:prstGeom>
+          <a:solidFill>
+            <a:srgbClr val="000000"/>
+          </a:solidFill>
+          <a:ln w="9360">
+            <a:solidFill>
+              <a:srgbClr val="328EA0"/>
+            </a:solidFill>
+            <a:round/>
+          </a:ln>
+        </p:spPr>
+        <p:txBody>
+          <a:bodyPr lIns="99000" tIns="49680" rIns="99000" bIns="49680" anchor="ctr"/>
+          <a:lstStyle/>
+          <a:p>
+            <a:pPr>
+              <a:lnSpc>
+                <a:spcPct val="100000"/>
+              </a:lnSpc>
+            </a:pPr>
+            <a:endParaRPr/>
+          </a:p>
+          <a:p>
+            <a:pPr>
+              <a:lnSpc>
+                <a:spcPct val="100000"/>
+              </a:lnSpc>
+            </a:pPr>
+            <a:r>
+              <a:rPr lang="en-IN" sz="1300">
+                <a:solidFill>
+                  <a:srgbClr val="000000"/>
+                </a:solidFill>
+                <a:latin typeface="Courier New"/>
+                <a:ea typeface="+mn-ea"/>
+              </a:rPr>
+              <a:t>def f(x,n):</a:t>
+            </a:r>
+            <a:endParaRPr/>
+          </a:p>
+          <a:p>
+            <a:pPr>
+              <a:lnSpc>
+                <a:spcPct val="100000"/>
+              </a:lnSpc>
+            </a:pPr>
+            <a:r>
+              <a:rPr lang="en-IN" sz="1300">
+                <a:solidFill>
+                  <a:srgbClr val="000000"/>
+                </a:solidFill>
+                <a:latin typeface="Courier New"/>
+                <a:ea typeface="+mn-ea"/>
+              </a:rPr>
+              <a:t>return(x+n)</a:t>
+            </a:r>
+            <a:endParaRPr/>
+          </a:p>
+          <a:p>
+            <a:pPr>
+              <a:lnSpc>
+                <a:spcPct val="100000"/>
+              </a:lnSpc>
+            </a:pPr>
+            <a:r>
+              <a:rPr lang="en-IN" sz="1300">
+                <a:solidFill>
+                  <a:srgbClr val="000000"/>
+                </a:solidFill>
+                <a:latin typeface="Courier New"/>
+                <a:ea typeface="+mn-ea"/>
+              </a:rPr>
+              <a:t>g = lambda x,n: x+n</a:t>
+            </a:r>
+            <a:endParaRPr/>
+          </a:p>
+          <a:p>
+            <a:pPr>
+              <a:lnSpc>
+                <a:spcPct val="100000"/>
+              </a:lnSpc>
+            </a:pPr>
+            <a:r>
+              <a:rPr lang="en-IN" sz="1300">
+                <a:solidFill>
+                  <a:srgbClr val="000000"/>
+                </a:solidFill>
+                <a:latin typeface="Courier New"/>
+                <a:ea typeface="+mn-ea"/>
+              </a:rPr>
+              <a:t>print (f(1,2))</a:t>
+            </a:r>
+            <a:endParaRPr/>
+          </a:p>
+          <a:p>
+            <a:pPr>
+              <a:lnSpc>
+                <a:spcPct val="100000"/>
+              </a:lnSpc>
+            </a:pPr>
+            <a:r>
+              <a:rPr lang="en-IN" sz="1300">
+                <a:solidFill>
+                  <a:srgbClr val="000000"/>
+                </a:solidFill>
+                <a:latin typeface="Courier New"/>
+                <a:ea typeface="+mn-ea"/>
+              </a:rPr>
+              <a:t>print (g(1,2))</a:t>
+            </a:r>
+            <a:endParaRPr/>
+          </a:p>
+          <a:p>
+            <a:pPr algn="ctr">
+              <a:lnSpc>
+                <a:spcPct val="100000"/>
+              </a:lnSpc>
+            </a:pPr>
             <a:endParaRPr/>
           </a:p>
         </p:txBody>
@@ -28675,6 +29920,934 @@
 </p:sld>
 </file>
 
+<file path=ppt/slides/slide37.xml><?xml version="1.0" encoding="utf-8"?>
+<p:sld xmlns:a="http://schemas.openxmlformats.org/drawingml/2006/main" xmlns:r="http://schemas.openxmlformats.org/officeDocument/2006/relationships" xmlns:p="http://schemas.openxmlformats.org/presentationml/2006/main">
+  <p:cSld>
+    <p:spTree>
+      <p:nvGrpSpPr>
+        <p:cNvPr id="1" name=""/>
+        <p:cNvGrpSpPr/>
+        <p:nvPr/>
+      </p:nvGrpSpPr>
+      <p:grpSpPr>
+        <a:xfrm>
+          <a:off x="0" y="0"/>
+          <a:ext cx="0" cy="0"/>
+          <a:chOff x="0" y="0"/>
+          <a:chExt cx="0" cy="0"/>
+        </a:xfrm>
+      </p:grpSpPr>
+      <p:sp>
+        <p:nvSpPr>
+          <p:cNvPr id="89" name="TextShape 1"/>
+          <p:cNvSpPr txBox="1"/>
+          <p:nvPr/>
+        </p:nvSpPr>
+        <p:spPr>
+          <a:xfrm>
+            <a:off x="1523880" y="1122480"/>
+            <a:ext cx="9143640" cy="2387160"/>
+          </a:xfrm>
+          <a:prstGeom prst="rect">
+            <a:avLst/>
+          </a:prstGeom>
+        </p:spPr>
+        <p:txBody>
+          <a:bodyPr anchor="b"/>
+          <a:lstStyle/>
+          <a:p>
+            <a:pPr algn="ctr">
+              <a:lnSpc>
+                <a:spcPct val="100000"/>
+              </a:lnSpc>
+            </a:pPr>
+            <a:r>
+              <a:rPr lang="en-US" sz="6000" dirty="0">
+                <a:solidFill>
+                  <a:srgbClr val="5B9BD5"/>
+                </a:solidFill>
+                <a:latin typeface="Calibri Light"/>
+              </a:rPr>
+              <a:t>Module </a:t>
+            </a:r>
+            <a:r>
+              <a:rPr lang="en-US" sz="6000" dirty="0" smtClean="0">
+                <a:solidFill>
+                  <a:srgbClr val="5B9BD5"/>
+                </a:solidFill>
+                <a:latin typeface="Calibri Light"/>
+              </a:rPr>
+              <a:t>6</a:t>
+            </a:r>
+            <a:endParaRPr dirty="0"/>
+          </a:p>
+        </p:txBody>
+      </p:sp>
+      <p:sp>
+        <p:nvSpPr>
+          <p:cNvPr id="90" name="TextShape 2"/>
+          <p:cNvSpPr txBox="1"/>
+          <p:nvPr/>
+        </p:nvSpPr>
+        <p:spPr>
+          <a:xfrm>
+            <a:off x="1523880" y="3703680"/>
+            <a:ext cx="9143640" cy="1655280"/>
+          </a:xfrm>
+          <a:prstGeom prst="rect">
+            <a:avLst/>
+          </a:prstGeom>
+        </p:spPr>
+        <p:txBody>
+          <a:bodyPr/>
+          <a:lstStyle/>
+          <a:p>
+            <a:pPr algn="ctr">
+              <a:lnSpc>
+                <a:spcPct val="100000"/>
+              </a:lnSpc>
+            </a:pPr>
+            <a:r>
+              <a:rPr lang="en-IN" sz="2400" dirty="0" smtClean="0">
+                <a:solidFill>
+                  <a:srgbClr val="000000"/>
+                </a:solidFill>
+                <a:latin typeface="Calibri"/>
+              </a:rPr>
+              <a:t>Conclusions</a:t>
+            </a:r>
+            <a:endParaRPr dirty="0"/>
+          </a:p>
+        </p:txBody>
+      </p:sp>
+      <p:sp>
+        <p:nvSpPr>
+          <p:cNvPr id="91" name="CustomShape 3"/>
+          <p:cNvSpPr/>
+          <p:nvPr/>
+        </p:nvSpPr>
+        <p:spPr>
+          <a:xfrm>
+            <a:off x="507960" y="6356520"/>
+            <a:ext cx="930960" cy="272880"/>
+          </a:xfrm>
+          <a:prstGeom prst="rect">
+            <a:avLst/>
+          </a:prstGeom>
+          <a:noFill/>
+          <a:ln>
+            <a:noFill/>
+          </a:ln>
+        </p:spPr>
+        <p:txBody>
+          <a:bodyPr lIns="90000" tIns="45000" rIns="90000" bIns="45000"/>
+          <a:lstStyle/>
+          <a:p>
+            <a:pPr>
+              <a:lnSpc>
+                <a:spcPct val="100000"/>
+              </a:lnSpc>
+            </a:pPr>
+            <a:fld id="{E55FA6BC-6E9D-4AF8-8DFC-630F64A2741B}" type="slidenum">
+              <a:rPr lang="en-IN" sz="1200">
+                <a:solidFill>
+                  <a:srgbClr val="000000"/>
+                </a:solidFill>
+                <a:latin typeface="Calibri"/>
+              </a:rPr>
+              <a:t>37</a:t>
+            </a:fld>
+            <a:endParaRPr/>
+          </a:p>
+        </p:txBody>
+      </p:sp>
+    </p:spTree>
+    <p:extLst>
+      <p:ext uri="{BB962C8B-B14F-4D97-AF65-F5344CB8AC3E}">
+        <p14:creationId xmlns:p14="http://schemas.microsoft.com/office/powerpoint/2010/main" val="2936705264"/>
+      </p:ext>
+    </p:extLst>
+  </p:cSld>
+  <p:clrMapOvr>
+    <a:masterClrMapping/>
+  </p:clrMapOvr>
+  <p:timing>
+    <p:tnLst>
+      <p:par>
+        <p:cTn id="1" dur="indefinite" restart="never" nodeType="tmRoot">
+          <p:childTnLst>
+            <p:seq>
+              <p:cTn id="2" nodeType="mainSeq"/>
+              <p:prevCondLst>
+                <p:cond evt="onPrev" delay="0">
+                  <p:tgtEl>
+                    <p:sldTgt/>
+                  </p:tgtEl>
+                </p:cond>
+              </p:prevCondLst>
+              <p:nextCondLst>
+                <p:cond evt="onNext" delay="0">
+                  <p:tgtEl>
+                    <p:sldTgt/>
+                  </p:tgtEl>
+                </p:cond>
+              </p:nextCondLst>
+            </p:seq>
+          </p:childTnLst>
+        </p:cTn>
+      </p:par>
+    </p:tnLst>
+  </p:timing>
+</p:sld>
+</file>
+
+<file path=ppt/slides/slide38.xml><?xml version="1.0" encoding="utf-8"?>
+<p:sld xmlns:a="http://schemas.openxmlformats.org/drawingml/2006/main" xmlns:r="http://schemas.openxmlformats.org/officeDocument/2006/relationships" xmlns:p="http://schemas.openxmlformats.org/presentationml/2006/main">
+  <p:cSld>
+    <p:spTree>
+      <p:nvGrpSpPr>
+        <p:cNvPr id="1" name=""/>
+        <p:cNvGrpSpPr/>
+        <p:nvPr/>
+      </p:nvGrpSpPr>
+      <p:grpSpPr>
+        <a:xfrm>
+          <a:off x="0" y="0"/>
+          <a:ext cx="0" cy="0"/>
+          <a:chOff x="0" y="0"/>
+          <a:chExt cx="0" cy="0"/>
+        </a:xfrm>
+      </p:grpSpPr>
+      <p:sp>
+        <p:nvSpPr>
+          <p:cNvPr id="104" name="TextShape 1"/>
+          <p:cNvSpPr txBox="1"/>
+          <p:nvPr/>
+        </p:nvSpPr>
+        <p:spPr>
+          <a:xfrm>
+            <a:off x="838080" y="1265760"/>
+            <a:ext cx="10515240" cy="4920840"/>
+          </a:xfrm>
+          <a:prstGeom prst="rect">
+            <a:avLst/>
+          </a:prstGeom>
+        </p:spPr>
+        <p:txBody>
+          <a:bodyPr/>
+          <a:lstStyle/>
+          <a:p>
+            <a:pPr>
+              <a:lnSpc>
+                <a:spcPct val="90000"/>
+              </a:lnSpc>
+            </a:pPr>
+            <a:endParaRPr lang="en-US" dirty="0"/>
+          </a:p>
+          <a:p>
+            <a:pPr>
+              <a:lnSpc>
+                <a:spcPct val="90000"/>
+              </a:lnSpc>
+              <a:buFont typeface="Arial"/>
+              <a:buChar char="•"/>
+            </a:pPr>
+            <a:r>
+              <a:rPr lang="en-US" sz="2800" dirty="0">
+                <a:latin typeface="Calibri" pitchFamily="34" charset="0"/>
+                <a:cs typeface="Calibri" pitchFamily="34" charset="0"/>
+              </a:rPr>
+              <a:t> </a:t>
+            </a:r>
+            <a:r>
+              <a:rPr lang="en-US" sz="2800" dirty="0" err="1" smtClean="0">
+                <a:latin typeface="Calibri" pitchFamily="34" charset="0"/>
+                <a:cs typeface="Calibri" pitchFamily="34" charset="0"/>
+              </a:rPr>
+              <a:t>Blockchain</a:t>
+            </a:r>
+            <a:r>
+              <a:rPr lang="en-US" sz="2800" dirty="0" smtClean="0">
+                <a:latin typeface="Calibri" pitchFamily="34" charset="0"/>
+                <a:cs typeface="Calibri" pitchFamily="34" charset="0"/>
+              </a:rPr>
+              <a:t> technology is poised to disrupt many areas of commerce, including finance, logistics, governmental operations and many other areas. </a:t>
+            </a:r>
+          </a:p>
+          <a:p>
+            <a:pPr>
+              <a:lnSpc>
+                <a:spcPct val="90000"/>
+              </a:lnSpc>
+              <a:buFont typeface="Arial"/>
+              <a:buChar char="•"/>
+            </a:pPr>
+            <a:endParaRPr lang="en-US" sz="2800" dirty="0">
+              <a:latin typeface="Calibri" pitchFamily="34" charset="0"/>
+              <a:cs typeface="Calibri" pitchFamily="34" charset="0"/>
+            </a:endParaRPr>
+          </a:p>
+          <a:p>
+            <a:pPr>
+              <a:lnSpc>
+                <a:spcPct val="90000"/>
+              </a:lnSpc>
+              <a:buFont typeface="Arial"/>
+              <a:buChar char="•"/>
+            </a:pPr>
+            <a:r>
+              <a:rPr lang="en-US" sz="2800" dirty="0" smtClean="0">
+                <a:latin typeface="Calibri" pitchFamily="34" charset="0"/>
+                <a:cs typeface="Calibri" pitchFamily="34" charset="0"/>
+              </a:rPr>
+              <a:t> Although </a:t>
+            </a:r>
+            <a:r>
+              <a:rPr lang="en-US" sz="2800" dirty="0" err="1" smtClean="0">
+                <a:latin typeface="Calibri" pitchFamily="34" charset="0"/>
+                <a:cs typeface="Calibri" pitchFamily="34" charset="0"/>
+              </a:rPr>
+              <a:t>Bitcoin</a:t>
+            </a:r>
+            <a:r>
+              <a:rPr lang="en-US" sz="2800" dirty="0" smtClean="0">
+                <a:latin typeface="Calibri" pitchFamily="34" charset="0"/>
+                <a:cs typeface="Calibri" pitchFamily="34" charset="0"/>
+              </a:rPr>
+              <a:t> is still garnering the vast majority of media attention, other </a:t>
+            </a:r>
+            <a:r>
+              <a:rPr lang="en-US" sz="2800" dirty="0" err="1" smtClean="0">
+                <a:latin typeface="Calibri" pitchFamily="34" charset="0"/>
+                <a:cs typeface="Calibri" pitchFamily="34" charset="0"/>
+              </a:rPr>
+              <a:t>blockchains</a:t>
+            </a:r>
+            <a:r>
+              <a:rPr lang="en-US" sz="2800" dirty="0" smtClean="0">
+                <a:latin typeface="Calibri" pitchFamily="34" charset="0"/>
+                <a:cs typeface="Calibri" pitchFamily="34" charset="0"/>
+              </a:rPr>
+              <a:t>, such as </a:t>
+            </a:r>
+            <a:r>
+              <a:rPr lang="en-US" sz="2800" dirty="0" err="1" smtClean="0">
+                <a:latin typeface="Calibri" pitchFamily="34" charset="0"/>
+                <a:cs typeface="Calibri" pitchFamily="34" charset="0"/>
+              </a:rPr>
+              <a:t>Ethereum</a:t>
+            </a:r>
+            <a:r>
+              <a:rPr lang="en-US" sz="2800" dirty="0" smtClean="0">
+                <a:latin typeface="Calibri" pitchFamily="34" charset="0"/>
+                <a:cs typeface="Calibri" pitchFamily="34" charset="0"/>
+              </a:rPr>
+              <a:t> are also gaining a share of public awareness and attention.</a:t>
+            </a:r>
+          </a:p>
+          <a:p>
+            <a:pPr>
+              <a:lnSpc>
+                <a:spcPct val="90000"/>
+              </a:lnSpc>
+              <a:buFont typeface="Arial"/>
+              <a:buChar char="•"/>
+            </a:pPr>
+            <a:endParaRPr lang="en-US" sz="2800" dirty="0">
+              <a:latin typeface="Calibri" pitchFamily="34" charset="0"/>
+              <a:cs typeface="Calibri" pitchFamily="34" charset="0"/>
+            </a:endParaRPr>
+          </a:p>
+          <a:p>
+            <a:pPr>
+              <a:lnSpc>
+                <a:spcPct val="90000"/>
+              </a:lnSpc>
+              <a:buFont typeface="Arial"/>
+              <a:buChar char="•"/>
+            </a:pPr>
+            <a:r>
+              <a:rPr lang="en-US" sz="2800" dirty="0" smtClean="0">
+                <a:latin typeface="Calibri" pitchFamily="34" charset="0"/>
+                <a:cs typeface="Calibri" pitchFamily="34" charset="0"/>
+              </a:rPr>
+              <a:t> Many companies are starting to experiment with non-financial use-cases of the </a:t>
+            </a:r>
+            <a:r>
+              <a:rPr lang="en-US" sz="2800" dirty="0" err="1" smtClean="0">
+                <a:latin typeface="Calibri" pitchFamily="34" charset="0"/>
+                <a:cs typeface="Calibri" pitchFamily="34" charset="0"/>
+              </a:rPr>
+              <a:t>Blockchain</a:t>
+            </a:r>
+            <a:r>
+              <a:rPr lang="en-US" sz="2800" dirty="0" smtClean="0">
+                <a:latin typeface="Calibri" pitchFamily="34" charset="0"/>
+                <a:cs typeface="Calibri" pitchFamily="34" charset="0"/>
+              </a:rPr>
+              <a:t>.  The diamond industry, for example, is using the </a:t>
+            </a:r>
+            <a:r>
+              <a:rPr lang="en-US" sz="2800" dirty="0" err="1" smtClean="0">
+                <a:latin typeface="Calibri" pitchFamily="34" charset="0"/>
+                <a:cs typeface="Calibri" pitchFamily="34" charset="0"/>
+              </a:rPr>
+              <a:t>blockchain</a:t>
+            </a:r>
+            <a:r>
+              <a:rPr lang="en-US" sz="2800" dirty="0" smtClean="0">
+                <a:latin typeface="Calibri" pitchFamily="34" charset="0"/>
+                <a:cs typeface="Calibri" pitchFamily="34" charset="0"/>
+              </a:rPr>
+              <a:t> to establish provenance over the source of diamonds. </a:t>
+            </a:r>
+            <a:endParaRPr lang="en-US" sz="2800" dirty="0">
+              <a:latin typeface="Calibri" pitchFamily="34" charset="0"/>
+              <a:cs typeface="Calibri" pitchFamily="34" charset="0"/>
+            </a:endParaRPr>
+          </a:p>
+          <a:p>
+            <a:pPr>
+              <a:lnSpc>
+                <a:spcPct val="90000"/>
+              </a:lnSpc>
+            </a:pPr>
+            <a:endParaRPr lang="en-US" sz="2800" dirty="0">
+              <a:latin typeface="Calibri" pitchFamily="34" charset="0"/>
+              <a:cs typeface="Calibri" pitchFamily="34" charset="0"/>
+            </a:endParaRPr>
+          </a:p>
+          <a:p>
+            <a:pPr>
+              <a:lnSpc>
+                <a:spcPct val="90000"/>
+              </a:lnSpc>
+              <a:buFont typeface="Arial"/>
+              <a:buChar char="•"/>
+            </a:pPr>
+            <a:endParaRPr dirty="0"/>
+          </a:p>
+          <a:p>
+            <a:pPr>
+              <a:lnSpc>
+                <a:spcPct val="90000"/>
+              </a:lnSpc>
+            </a:pPr>
+            <a:endParaRPr dirty="0"/>
+          </a:p>
+        </p:txBody>
+      </p:sp>
+      <p:sp>
+        <p:nvSpPr>
+          <p:cNvPr id="105" name="TextShape 2"/>
+          <p:cNvSpPr txBox="1"/>
+          <p:nvPr/>
+        </p:nvSpPr>
+        <p:spPr>
+          <a:xfrm>
+            <a:off x="838080" y="192600"/>
+            <a:ext cx="10515240" cy="903600"/>
+          </a:xfrm>
+          <a:prstGeom prst="rect">
+            <a:avLst/>
+          </a:prstGeom>
+        </p:spPr>
+        <p:txBody>
+          <a:bodyPr anchor="ctr"/>
+          <a:lstStyle/>
+          <a:p>
+            <a:r>
+              <a:rPr lang="en-US" sz="4000" dirty="0" smtClean="0">
+                <a:solidFill>
+                  <a:srgbClr val="5B9BD5"/>
+                </a:solidFill>
+                <a:latin typeface="Calibri Light"/>
+              </a:rPr>
+              <a:t>Conclusions and Predictions</a:t>
+            </a:r>
+            <a:endParaRPr lang="en-US" sz="4000" dirty="0"/>
+          </a:p>
+        </p:txBody>
+      </p:sp>
+      <p:sp>
+        <p:nvSpPr>
+          <p:cNvPr id="107" name="TextShape 4"/>
+          <p:cNvSpPr txBox="1"/>
+          <p:nvPr/>
+        </p:nvSpPr>
+        <p:spPr>
+          <a:xfrm>
+            <a:off x="3957840" y="6319080"/>
+            <a:ext cx="4312440" cy="381240"/>
+          </a:xfrm>
+          <a:prstGeom prst="rect">
+            <a:avLst/>
+          </a:prstGeom>
+        </p:spPr>
+        <p:txBody>
+          <a:bodyPr anchor="ctr"/>
+          <a:lstStyle/>
+          <a:p>
+            <a:pPr>
+              <a:lnSpc>
+                <a:spcPct val="100000"/>
+              </a:lnSpc>
+            </a:pPr>
+            <a:r>
+              <a:rPr lang="en-IN" sz="1200">
+                <a:solidFill>
+                  <a:srgbClr val="8B8B8B"/>
+                </a:solidFill>
+                <a:latin typeface="Calibri"/>
+              </a:rPr>
+              <a:t>Python for Tool Developers</a:t>
+            </a:r>
+            <a:endParaRPr/>
+          </a:p>
+        </p:txBody>
+      </p:sp>
+      <p:sp>
+        <p:nvSpPr>
+          <p:cNvPr id="108" name="CustomShape 5"/>
+          <p:cNvSpPr/>
+          <p:nvPr/>
+        </p:nvSpPr>
+        <p:spPr>
+          <a:xfrm>
+            <a:off x="507960" y="6356520"/>
+            <a:ext cx="930960" cy="272880"/>
+          </a:xfrm>
+          <a:prstGeom prst="rect">
+            <a:avLst/>
+          </a:prstGeom>
+          <a:noFill/>
+          <a:ln>
+            <a:noFill/>
+          </a:ln>
+        </p:spPr>
+        <p:txBody>
+          <a:bodyPr lIns="90000" tIns="45000" rIns="90000" bIns="45000"/>
+          <a:lstStyle/>
+          <a:p>
+            <a:pPr>
+              <a:lnSpc>
+                <a:spcPct val="100000"/>
+              </a:lnSpc>
+            </a:pPr>
+            <a:fld id="{E062F212-EC51-4F87-B534-F3B507A69488}" type="slidenum">
+              <a:rPr lang="en-IN" sz="1200">
+                <a:solidFill>
+                  <a:srgbClr val="000000"/>
+                </a:solidFill>
+                <a:latin typeface="Calibri"/>
+              </a:rPr>
+              <a:t>38</a:t>
+            </a:fld>
+            <a:endParaRPr/>
+          </a:p>
+        </p:txBody>
+      </p:sp>
+    </p:spTree>
+    <p:extLst>
+      <p:ext uri="{BB962C8B-B14F-4D97-AF65-F5344CB8AC3E}">
+        <p14:creationId xmlns:p14="http://schemas.microsoft.com/office/powerpoint/2010/main" val="3073830772"/>
+      </p:ext>
+    </p:extLst>
+  </p:cSld>
+  <p:clrMapOvr>
+    <a:masterClrMapping/>
+  </p:clrMapOvr>
+  <p:timing>
+    <p:tnLst>
+      <p:par>
+        <p:cTn id="1" dur="indefinite" restart="never" nodeType="tmRoot">
+          <p:childTnLst>
+            <p:seq>
+              <p:cTn id="2" nodeType="mainSeq"/>
+              <p:prevCondLst>
+                <p:cond evt="onPrev" delay="0">
+                  <p:tgtEl>
+                    <p:sldTgt/>
+                  </p:tgtEl>
+                </p:cond>
+              </p:prevCondLst>
+              <p:nextCondLst>
+                <p:cond evt="onNext" delay="0">
+                  <p:tgtEl>
+                    <p:sldTgt/>
+                  </p:tgtEl>
+                </p:cond>
+              </p:nextCondLst>
+            </p:seq>
+          </p:childTnLst>
+        </p:cTn>
+      </p:par>
+    </p:tnLst>
+  </p:timing>
+</p:sld>
+</file>
+
+<file path=ppt/slides/slide39.xml><?xml version="1.0" encoding="utf-8"?>
+<p:sld xmlns:a="http://schemas.openxmlformats.org/drawingml/2006/main" xmlns:r="http://schemas.openxmlformats.org/officeDocument/2006/relationships" xmlns:p="http://schemas.openxmlformats.org/presentationml/2006/main">
+  <p:cSld>
+    <p:spTree>
+      <p:nvGrpSpPr>
+        <p:cNvPr id="1" name=""/>
+        <p:cNvGrpSpPr/>
+        <p:nvPr/>
+      </p:nvGrpSpPr>
+      <p:grpSpPr>
+        <a:xfrm>
+          <a:off x="0" y="0"/>
+          <a:ext cx="0" cy="0"/>
+          <a:chOff x="0" y="0"/>
+          <a:chExt cx="0" cy="0"/>
+        </a:xfrm>
+      </p:grpSpPr>
+      <p:sp>
+        <p:nvSpPr>
+          <p:cNvPr id="104" name="TextShape 1"/>
+          <p:cNvSpPr txBox="1"/>
+          <p:nvPr/>
+        </p:nvSpPr>
+        <p:spPr>
+          <a:xfrm>
+            <a:off x="838080" y="1265760"/>
+            <a:ext cx="10515240" cy="4920840"/>
+          </a:xfrm>
+          <a:prstGeom prst="rect">
+            <a:avLst/>
+          </a:prstGeom>
+        </p:spPr>
+        <p:txBody>
+          <a:bodyPr/>
+          <a:lstStyle/>
+          <a:p>
+            <a:pPr>
+              <a:lnSpc>
+                <a:spcPct val="90000"/>
+              </a:lnSpc>
+            </a:pPr>
+            <a:endParaRPr lang="en-US" dirty="0"/>
+          </a:p>
+          <a:p>
+            <a:pPr>
+              <a:lnSpc>
+                <a:spcPct val="90000"/>
+              </a:lnSpc>
+              <a:buFont typeface="Arial"/>
+              <a:buChar char="•"/>
+            </a:pPr>
+            <a:r>
+              <a:rPr lang="en-US" sz="2800" dirty="0">
+                <a:latin typeface="Calibri" pitchFamily="34" charset="0"/>
+                <a:cs typeface="Calibri" pitchFamily="34" charset="0"/>
+              </a:rPr>
+              <a:t> </a:t>
+            </a:r>
+            <a:r>
+              <a:rPr lang="en-US" sz="2800" dirty="0" smtClean="0">
+                <a:latin typeface="Calibri" pitchFamily="34" charset="0"/>
+                <a:cs typeface="Calibri" pitchFamily="34" charset="0"/>
+              </a:rPr>
+              <a:t>Large financial institutions and technology companies are partnering to create consortiums to investigate and promote </a:t>
+            </a:r>
+            <a:r>
+              <a:rPr lang="en-US" sz="2800" dirty="0" err="1" smtClean="0">
+                <a:latin typeface="Calibri" pitchFamily="34" charset="0"/>
+                <a:cs typeface="Calibri" pitchFamily="34" charset="0"/>
+              </a:rPr>
+              <a:t>blockchain</a:t>
+            </a:r>
+            <a:r>
+              <a:rPr lang="en-US" sz="2800" dirty="0" smtClean="0">
+                <a:latin typeface="Calibri" pitchFamily="34" charset="0"/>
+                <a:cs typeface="Calibri" pitchFamily="34" charset="0"/>
+              </a:rPr>
+              <a:t> technologies, the </a:t>
+            </a:r>
+            <a:r>
+              <a:rPr lang="en-US" sz="2800" dirty="0" err="1" smtClean="0">
+                <a:latin typeface="Calibri" pitchFamily="34" charset="0"/>
+                <a:cs typeface="Calibri" pitchFamily="34" charset="0"/>
+              </a:rPr>
+              <a:t>Hyperledger</a:t>
+            </a:r>
+            <a:r>
+              <a:rPr lang="en-US" sz="2800" dirty="0" smtClean="0">
+                <a:latin typeface="Calibri" pitchFamily="34" charset="0"/>
+                <a:cs typeface="Calibri" pitchFamily="34" charset="0"/>
+              </a:rPr>
+              <a:t> being a notable example.</a:t>
+            </a:r>
+          </a:p>
+          <a:p>
+            <a:pPr>
+              <a:lnSpc>
+                <a:spcPct val="90000"/>
+              </a:lnSpc>
+              <a:buFont typeface="Arial"/>
+              <a:buChar char="•"/>
+            </a:pPr>
+            <a:endParaRPr lang="en-US" sz="2800" dirty="0">
+              <a:latin typeface="Calibri" pitchFamily="34" charset="0"/>
+              <a:cs typeface="Calibri" pitchFamily="34" charset="0"/>
+            </a:endParaRPr>
+          </a:p>
+          <a:p>
+            <a:pPr>
+              <a:lnSpc>
+                <a:spcPct val="90000"/>
+              </a:lnSpc>
+              <a:buFont typeface="Arial"/>
+              <a:buChar char="•"/>
+            </a:pPr>
+            <a:r>
+              <a:rPr lang="en-US" sz="2800" dirty="0">
+                <a:latin typeface="Calibri" pitchFamily="34" charset="0"/>
+                <a:cs typeface="Calibri" pitchFamily="34" charset="0"/>
+              </a:rPr>
+              <a:t> </a:t>
+            </a:r>
+            <a:r>
+              <a:rPr lang="en-US" sz="2800" dirty="0" smtClean="0">
+                <a:latin typeface="Calibri" pitchFamily="34" charset="0"/>
+                <a:cs typeface="Calibri" pitchFamily="34" charset="0"/>
+              </a:rPr>
+              <a:t>Although there is a considerable buzz around the price of </a:t>
+            </a:r>
+            <a:r>
+              <a:rPr lang="en-US" sz="2800" dirty="0" err="1" smtClean="0">
+                <a:latin typeface="Calibri" pitchFamily="34" charset="0"/>
+                <a:cs typeface="Calibri" pitchFamily="34" charset="0"/>
+              </a:rPr>
+              <a:t>Bitcoin</a:t>
+            </a:r>
+            <a:r>
+              <a:rPr lang="en-US" sz="2800" dirty="0" smtClean="0">
+                <a:latin typeface="Calibri" pitchFamily="34" charset="0"/>
+                <a:cs typeface="Calibri" pitchFamily="34" charset="0"/>
+              </a:rPr>
+              <a:t> and other </a:t>
+            </a:r>
+            <a:r>
+              <a:rPr lang="en-US" sz="2800" dirty="0" err="1" smtClean="0">
+                <a:latin typeface="Calibri" pitchFamily="34" charset="0"/>
+                <a:cs typeface="Calibri" pitchFamily="34" charset="0"/>
+              </a:rPr>
+              <a:t>cryptocurrencies</a:t>
+            </a:r>
+            <a:r>
+              <a:rPr lang="en-US" sz="2800" dirty="0" smtClean="0">
+                <a:latin typeface="Calibri" pitchFamily="34" charset="0"/>
+                <a:cs typeface="Calibri" pitchFamily="34" charset="0"/>
+              </a:rPr>
+              <a:t>, the real value is still to be felt.  </a:t>
+            </a:r>
+          </a:p>
+          <a:p>
+            <a:pPr>
+              <a:lnSpc>
+                <a:spcPct val="90000"/>
+              </a:lnSpc>
+              <a:buFont typeface="Arial"/>
+              <a:buChar char="•"/>
+            </a:pPr>
+            <a:endParaRPr lang="en-US" sz="2800" dirty="0">
+              <a:latin typeface="Calibri" pitchFamily="34" charset="0"/>
+              <a:cs typeface="Calibri" pitchFamily="34" charset="0"/>
+            </a:endParaRPr>
+          </a:p>
+          <a:p>
+            <a:pPr>
+              <a:lnSpc>
+                <a:spcPct val="90000"/>
+              </a:lnSpc>
+              <a:buFont typeface="Arial"/>
+              <a:buChar char="•"/>
+            </a:pPr>
+            <a:r>
+              <a:rPr lang="en-US" sz="2800" dirty="0" smtClean="0">
+                <a:latin typeface="Calibri" pitchFamily="34" charset="0"/>
+                <a:cs typeface="Calibri" pitchFamily="34" charset="0"/>
+              </a:rPr>
+              <a:t> We’re still in the early stages of this technology.   There are a lot of issue to be resolved in technology, regulatory acceptance and market acceptance. </a:t>
+            </a:r>
+            <a:endParaRPr lang="en-US" sz="2800" dirty="0">
+              <a:latin typeface="Calibri" pitchFamily="34" charset="0"/>
+              <a:cs typeface="Calibri" pitchFamily="34" charset="0"/>
+            </a:endParaRPr>
+          </a:p>
+          <a:p>
+            <a:pPr>
+              <a:lnSpc>
+                <a:spcPct val="90000"/>
+              </a:lnSpc>
+              <a:buFont typeface="Arial"/>
+              <a:buChar char="•"/>
+            </a:pPr>
+            <a:endParaRPr dirty="0"/>
+          </a:p>
+          <a:p>
+            <a:pPr>
+              <a:lnSpc>
+                <a:spcPct val="90000"/>
+              </a:lnSpc>
+            </a:pPr>
+            <a:endParaRPr dirty="0"/>
+          </a:p>
+        </p:txBody>
+      </p:sp>
+      <p:sp>
+        <p:nvSpPr>
+          <p:cNvPr id="105" name="TextShape 2"/>
+          <p:cNvSpPr txBox="1"/>
+          <p:nvPr/>
+        </p:nvSpPr>
+        <p:spPr>
+          <a:xfrm>
+            <a:off x="838080" y="192600"/>
+            <a:ext cx="10515240" cy="903600"/>
+          </a:xfrm>
+          <a:prstGeom prst="rect">
+            <a:avLst/>
+          </a:prstGeom>
+        </p:spPr>
+        <p:txBody>
+          <a:bodyPr anchor="ctr"/>
+          <a:lstStyle/>
+          <a:p>
+            <a:r>
+              <a:rPr lang="en-US" sz="4000" dirty="0" smtClean="0">
+                <a:solidFill>
+                  <a:srgbClr val="5B9BD5"/>
+                </a:solidFill>
+                <a:latin typeface="Calibri Light"/>
+              </a:rPr>
+              <a:t>Conclusions and Predictions</a:t>
+            </a:r>
+            <a:endParaRPr lang="en-US" sz="4000" dirty="0"/>
+          </a:p>
+        </p:txBody>
+      </p:sp>
+      <p:sp>
+        <p:nvSpPr>
+          <p:cNvPr id="107" name="TextShape 4"/>
+          <p:cNvSpPr txBox="1"/>
+          <p:nvPr/>
+        </p:nvSpPr>
+        <p:spPr>
+          <a:xfrm>
+            <a:off x="3957840" y="6319080"/>
+            <a:ext cx="4312440" cy="381240"/>
+          </a:xfrm>
+          <a:prstGeom prst="rect">
+            <a:avLst/>
+          </a:prstGeom>
+        </p:spPr>
+        <p:txBody>
+          <a:bodyPr anchor="ctr"/>
+          <a:lstStyle/>
+          <a:p>
+            <a:pPr>
+              <a:lnSpc>
+                <a:spcPct val="100000"/>
+              </a:lnSpc>
+            </a:pPr>
+            <a:r>
+              <a:rPr lang="en-IN" sz="1200">
+                <a:solidFill>
+                  <a:srgbClr val="8B8B8B"/>
+                </a:solidFill>
+                <a:latin typeface="Calibri"/>
+              </a:rPr>
+              <a:t>Python for Tool Developers</a:t>
+            </a:r>
+            <a:endParaRPr/>
+          </a:p>
+        </p:txBody>
+      </p:sp>
+      <p:sp>
+        <p:nvSpPr>
+          <p:cNvPr id="108" name="CustomShape 5"/>
+          <p:cNvSpPr/>
+          <p:nvPr/>
+        </p:nvSpPr>
+        <p:spPr>
+          <a:xfrm>
+            <a:off x="507960" y="6356520"/>
+            <a:ext cx="930960" cy="272880"/>
+          </a:xfrm>
+          <a:prstGeom prst="rect">
+            <a:avLst/>
+          </a:prstGeom>
+          <a:noFill/>
+          <a:ln>
+            <a:noFill/>
+          </a:ln>
+        </p:spPr>
+        <p:txBody>
+          <a:bodyPr lIns="90000" tIns="45000" rIns="90000" bIns="45000"/>
+          <a:lstStyle/>
+          <a:p>
+            <a:pPr>
+              <a:lnSpc>
+                <a:spcPct val="100000"/>
+              </a:lnSpc>
+            </a:pPr>
+            <a:fld id="{E062F212-EC51-4F87-B534-F3B507A69488}" type="slidenum">
+              <a:rPr lang="en-IN" sz="1200">
+                <a:solidFill>
+                  <a:srgbClr val="000000"/>
+                </a:solidFill>
+                <a:latin typeface="Calibri"/>
+              </a:rPr>
+              <a:t>39</a:t>
+            </a:fld>
+            <a:endParaRPr/>
+          </a:p>
+        </p:txBody>
+      </p:sp>
+    </p:spTree>
+    <p:extLst>
+      <p:ext uri="{BB962C8B-B14F-4D97-AF65-F5344CB8AC3E}">
+        <p14:creationId xmlns:p14="http://schemas.microsoft.com/office/powerpoint/2010/main" val="1226435882"/>
+      </p:ext>
+    </p:extLst>
+  </p:cSld>
+  <p:clrMapOvr>
+    <a:masterClrMapping/>
+  </p:clrMapOvr>
+  <p:timing>
+    <p:tnLst>
+      <p:par>
+        <p:cTn id="1" dur="indefinite" restart="never" nodeType="tmRoot">
+          <p:childTnLst>
+            <p:seq>
+              <p:cTn id="2" nodeType="mainSeq"/>
+              <p:prevCondLst>
+                <p:cond evt="onPrev" delay="0">
+                  <p:tgtEl>
+                    <p:sldTgt/>
+                  </p:tgtEl>
+                </p:cond>
+              </p:prevCondLst>
+              <p:nextCondLst>
+                <p:cond evt="onNext" delay="0">
+                  <p:tgtEl>
+                    <p:sldTgt/>
+                  </p:tgtEl>
+                </p:cond>
+              </p:nextCondLst>
+            </p:seq>
+          </p:childTnLst>
+        </p:cTn>
+      </p:par>
+    </p:tnLst>
+  </p:timing>
+</p:sld>
+</file>
+
 <file path=ppt/slides/slide4.xml><?xml version="1.0" encoding="utf-8"?>
 <p:sld xmlns:a="http://schemas.openxmlformats.org/drawingml/2006/main" xmlns:r="http://schemas.openxmlformats.org/officeDocument/2006/relationships" xmlns:p="http://schemas.openxmlformats.org/presentationml/2006/main">
   <p:cSld>
@@ -29061,6 +31234,622 @@
         </p:txBody>
       </p:sp>
     </p:spTree>
+  </p:cSld>
+  <p:clrMapOvr>
+    <a:masterClrMapping/>
+  </p:clrMapOvr>
+  <p:timing>
+    <p:tnLst>
+      <p:par>
+        <p:cTn id="1" dur="indefinite" restart="never" nodeType="tmRoot">
+          <p:childTnLst>
+            <p:seq>
+              <p:cTn id="2" nodeType="mainSeq"/>
+              <p:prevCondLst>
+                <p:cond evt="onPrev" delay="0">
+                  <p:tgtEl>
+                    <p:sldTgt/>
+                  </p:tgtEl>
+                </p:cond>
+              </p:prevCondLst>
+              <p:nextCondLst>
+                <p:cond evt="onNext" delay="0">
+                  <p:tgtEl>
+                    <p:sldTgt/>
+                  </p:tgtEl>
+                </p:cond>
+              </p:nextCondLst>
+            </p:seq>
+          </p:childTnLst>
+        </p:cTn>
+      </p:par>
+    </p:tnLst>
+  </p:timing>
+</p:sld>
+</file>
+
+<file path=ppt/slides/slide40.xml><?xml version="1.0" encoding="utf-8"?>
+<p:sld xmlns:a="http://schemas.openxmlformats.org/drawingml/2006/main" xmlns:r="http://schemas.openxmlformats.org/officeDocument/2006/relationships" xmlns:p="http://schemas.openxmlformats.org/presentationml/2006/main">
+  <p:cSld>
+    <p:spTree>
+      <p:nvGrpSpPr>
+        <p:cNvPr id="1" name=""/>
+        <p:cNvGrpSpPr/>
+        <p:nvPr/>
+      </p:nvGrpSpPr>
+      <p:grpSpPr>
+        <a:xfrm>
+          <a:off x="0" y="0"/>
+          <a:ext cx="0" cy="0"/>
+          <a:chOff x="0" y="0"/>
+          <a:chExt cx="0" cy="0"/>
+        </a:xfrm>
+      </p:grpSpPr>
+      <p:sp>
+        <p:nvSpPr>
+          <p:cNvPr id="104" name="TextShape 1"/>
+          <p:cNvSpPr txBox="1"/>
+          <p:nvPr/>
+        </p:nvSpPr>
+        <p:spPr>
+          <a:xfrm>
+            <a:off x="838080" y="1265760"/>
+            <a:ext cx="10515240" cy="4920840"/>
+          </a:xfrm>
+          <a:prstGeom prst="rect">
+            <a:avLst/>
+          </a:prstGeom>
+        </p:spPr>
+        <p:txBody>
+          <a:bodyPr/>
+          <a:lstStyle/>
+          <a:p>
+            <a:pPr>
+              <a:lnSpc>
+                <a:spcPct val="90000"/>
+              </a:lnSpc>
+            </a:pPr>
+            <a:endParaRPr lang="en-US" dirty="0"/>
+          </a:p>
+          <a:p>
+            <a:pPr>
+              <a:lnSpc>
+                <a:spcPct val="90000"/>
+              </a:lnSpc>
+              <a:buFont typeface="Arial"/>
+              <a:buChar char="•"/>
+            </a:pPr>
+            <a:r>
+              <a:rPr lang="en-US" sz="2800" dirty="0" smtClean="0">
+                <a:latin typeface="Calibri" pitchFamily="34" charset="0"/>
+                <a:cs typeface="Calibri" pitchFamily="34" charset="0"/>
+              </a:rPr>
+              <a:t>The remainder of this decade will see more innovation and experimentation with </a:t>
+            </a:r>
+            <a:r>
+              <a:rPr lang="en-US" sz="2800" dirty="0" err="1" smtClean="0">
+                <a:latin typeface="Calibri" pitchFamily="34" charset="0"/>
+                <a:cs typeface="Calibri" pitchFamily="34" charset="0"/>
+              </a:rPr>
+              <a:t>blockchain</a:t>
+            </a:r>
+            <a:r>
+              <a:rPr lang="en-US" sz="2800" dirty="0" smtClean="0">
+                <a:latin typeface="Calibri" pitchFamily="34" charset="0"/>
+                <a:cs typeface="Calibri" pitchFamily="34" charset="0"/>
+              </a:rPr>
+              <a:t> technology rather than mainstream adoption. </a:t>
+            </a:r>
+          </a:p>
+          <a:p>
+            <a:pPr>
+              <a:lnSpc>
+                <a:spcPct val="90000"/>
+              </a:lnSpc>
+              <a:buFont typeface="Arial"/>
+              <a:buChar char="•"/>
+            </a:pPr>
+            <a:endParaRPr lang="en-US" sz="2800" dirty="0">
+              <a:latin typeface="Calibri" pitchFamily="34" charset="0"/>
+              <a:cs typeface="Calibri" pitchFamily="34" charset="0"/>
+            </a:endParaRPr>
+          </a:p>
+          <a:p>
+            <a:pPr>
+              <a:lnSpc>
+                <a:spcPct val="90000"/>
+              </a:lnSpc>
+              <a:buFont typeface="Arial"/>
+              <a:buChar char="•"/>
+            </a:pPr>
+            <a:r>
+              <a:rPr lang="en-US" sz="2800" dirty="0" smtClean="0">
+                <a:latin typeface="Calibri" pitchFamily="34" charset="0"/>
+                <a:cs typeface="Calibri" pitchFamily="34" charset="0"/>
+              </a:rPr>
+              <a:t> The first widespread applications will gain transaction early in the next decade.  </a:t>
+            </a:r>
+          </a:p>
+          <a:p>
+            <a:pPr>
+              <a:lnSpc>
+                <a:spcPct val="90000"/>
+              </a:lnSpc>
+              <a:buFont typeface="Arial"/>
+              <a:buChar char="•"/>
+            </a:pPr>
+            <a:endParaRPr lang="en-US" sz="2800" dirty="0">
+              <a:latin typeface="Calibri" pitchFamily="34" charset="0"/>
+              <a:cs typeface="Calibri" pitchFamily="34" charset="0"/>
+            </a:endParaRPr>
+          </a:p>
+          <a:p>
+            <a:pPr>
+              <a:lnSpc>
+                <a:spcPct val="90000"/>
+              </a:lnSpc>
+              <a:buFont typeface="Arial"/>
+              <a:buChar char="•"/>
+            </a:pPr>
+            <a:r>
+              <a:rPr lang="en-US" sz="2800" dirty="0" smtClean="0">
+                <a:latin typeface="Calibri" pitchFamily="34" charset="0"/>
+                <a:cs typeface="Calibri" pitchFamily="34" charset="0"/>
+              </a:rPr>
+              <a:t> The </a:t>
+            </a:r>
+            <a:r>
+              <a:rPr lang="en-US" sz="2800" dirty="0" err="1" smtClean="0">
+                <a:latin typeface="Calibri" pitchFamily="34" charset="0"/>
+                <a:cs typeface="Calibri" pitchFamily="34" charset="0"/>
+              </a:rPr>
+              <a:t>blockchain</a:t>
+            </a:r>
+            <a:r>
+              <a:rPr lang="en-US" sz="2800" dirty="0" smtClean="0">
+                <a:latin typeface="Calibri" pitchFamily="34" charset="0"/>
+                <a:cs typeface="Calibri" pitchFamily="34" charset="0"/>
+              </a:rPr>
+              <a:t> lends it self well to other emerging technologies, such as the Internet of Things. </a:t>
+            </a:r>
+            <a:endParaRPr dirty="0"/>
+          </a:p>
+          <a:p>
+            <a:pPr>
+              <a:lnSpc>
+                <a:spcPct val="90000"/>
+              </a:lnSpc>
+            </a:pPr>
+            <a:endParaRPr dirty="0"/>
+          </a:p>
+        </p:txBody>
+      </p:sp>
+      <p:sp>
+        <p:nvSpPr>
+          <p:cNvPr id="105" name="TextShape 2"/>
+          <p:cNvSpPr txBox="1"/>
+          <p:nvPr/>
+        </p:nvSpPr>
+        <p:spPr>
+          <a:xfrm>
+            <a:off x="838080" y="192600"/>
+            <a:ext cx="10515240" cy="903600"/>
+          </a:xfrm>
+          <a:prstGeom prst="rect">
+            <a:avLst/>
+          </a:prstGeom>
+        </p:spPr>
+        <p:txBody>
+          <a:bodyPr anchor="ctr"/>
+          <a:lstStyle/>
+          <a:p>
+            <a:r>
+              <a:rPr lang="en-US" sz="4000" dirty="0" smtClean="0">
+                <a:solidFill>
+                  <a:srgbClr val="5B9BD5"/>
+                </a:solidFill>
+                <a:latin typeface="Calibri Light"/>
+              </a:rPr>
+              <a:t>Conclusions and Predictions</a:t>
+            </a:r>
+            <a:endParaRPr lang="en-US" sz="4000" dirty="0"/>
+          </a:p>
+        </p:txBody>
+      </p:sp>
+      <p:sp>
+        <p:nvSpPr>
+          <p:cNvPr id="107" name="TextShape 4"/>
+          <p:cNvSpPr txBox="1"/>
+          <p:nvPr/>
+        </p:nvSpPr>
+        <p:spPr>
+          <a:xfrm>
+            <a:off x="3957840" y="6319080"/>
+            <a:ext cx="4312440" cy="381240"/>
+          </a:xfrm>
+          <a:prstGeom prst="rect">
+            <a:avLst/>
+          </a:prstGeom>
+        </p:spPr>
+        <p:txBody>
+          <a:bodyPr anchor="ctr"/>
+          <a:lstStyle/>
+          <a:p>
+            <a:pPr>
+              <a:lnSpc>
+                <a:spcPct val="100000"/>
+              </a:lnSpc>
+            </a:pPr>
+            <a:r>
+              <a:rPr lang="en-IN" sz="1200">
+                <a:solidFill>
+                  <a:srgbClr val="8B8B8B"/>
+                </a:solidFill>
+                <a:latin typeface="Calibri"/>
+              </a:rPr>
+              <a:t>Python for Tool Developers</a:t>
+            </a:r>
+            <a:endParaRPr/>
+          </a:p>
+        </p:txBody>
+      </p:sp>
+      <p:sp>
+        <p:nvSpPr>
+          <p:cNvPr id="108" name="CustomShape 5"/>
+          <p:cNvSpPr/>
+          <p:nvPr/>
+        </p:nvSpPr>
+        <p:spPr>
+          <a:xfrm>
+            <a:off x="507960" y="6356520"/>
+            <a:ext cx="930960" cy="272880"/>
+          </a:xfrm>
+          <a:prstGeom prst="rect">
+            <a:avLst/>
+          </a:prstGeom>
+          <a:noFill/>
+          <a:ln>
+            <a:noFill/>
+          </a:ln>
+        </p:spPr>
+        <p:txBody>
+          <a:bodyPr lIns="90000" tIns="45000" rIns="90000" bIns="45000"/>
+          <a:lstStyle/>
+          <a:p>
+            <a:pPr>
+              <a:lnSpc>
+                <a:spcPct val="100000"/>
+              </a:lnSpc>
+            </a:pPr>
+            <a:fld id="{E062F212-EC51-4F87-B534-F3B507A69488}" type="slidenum">
+              <a:rPr lang="en-IN" sz="1200">
+                <a:solidFill>
+                  <a:srgbClr val="000000"/>
+                </a:solidFill>
+                <a:latin typeface="Calibri"/>
+              </a:rPr>
+              <a:t>40</a:t>
+            </a:fld>
+            <a:endParaRPr/>
+          </a:p>
+        </p:txBody>
+      </p:sp>
+    </p:spTree>
+    <p:extLst>
+      <p:ext uri="{BB962C8B-B14F-4D97-AF65-F5344CB8AC3E}">
+        <p14:creationId xmlns:p14="http://schemas.microsoft.com/office/powerpoint/2010/main" val="3005445238"/>
+      </p:ext>
+    </p:extLst>
+  </p:cSld>
+  <p:clrMapOvr>
+    <a:masterClrMapping/>
+  </p:clrMapOvr>
+  <p:timing>
+    <p:tnLst>
+      <p:par>
+        <p:cTn id="1" dur="indefinite" restart="never" nodeType="tmRoot">
+          <p:childTnLst>
+            <p:seq>
+              <p:cTn id="2" nodeType="mainSeq"/>
+              <p:prevCondLst>
+                <p:cond evt="onPrev" delay="0">
+                  <p:tgtEl>
+                    <p:sldTgt/>
+                  </p:tgtEl>
+                </p:cond>
+              </p:prevCondLst>
+              <p:nextCondLst>
+                <p:cond evt="onNext" delay="0">
+                  <p:tgtEl>
+                    <p:sldTgt/>
+                  </p:tgtEl>
+                </p:cond>
+              </p:nextCondLst>
+            </p:seq>
+          </p:childTnLst>
+        </p:cTn>
+      </p:par>
+    </p:tnLst>
+  </p:timing>
+</p:sld>
+</file>
+
+<file path=ppt/slides/slide41.xml><?xml version="1.0" encoding="utf-8"?>
+<p:sld xmlns:a="http://schemas.openxmlformats.org/drawingml/2006/main" xmlns:r="http://schemas.openxmlformats.org/officeDocument/2006/relationships" xmlns:p="http://schemas.openxmlformats.org/presentationml/2006/main">
+  <p:cSld>
+    <p:spTree>
+      <p:nvGrpSpPr>
+        <p:cNvPr id="1" name=""/>
+        <p:cNvGrpSpPr/>
+        <p:nvPr/>
+      </p:nvGrpSpPr>
+      <p:grpSpPr>
+        <a:xfrm>
+          <a:off x="0" y="0"/>
+          <a:ext cx="0" cy="0"/>
+          <a:chOff x="0" y="0"/>
+          <a:chExt cx="0" cy="0"/>
+        </a:xfrm>
+      </p:grpSpPr>
+      <p:sp>
+        <p:nvSpPr>
+          <p:cNvPr id="104" name="TextShape 1"/>
+          <p:cNvSpPr txBox="1"/>
+          <p:nvPr/>
+        </p:nvSpPr>
+        <p:spPr>
+          <a:xfrm>
+            <a:off x="838080" y="1265760"/>
+            <a:ext cx="10515240" cy="4920840"/>
+          </a:xfrm>
+          <a:prstGeom prst="rect">
+            <a:avLst/>
+          </a:prstGeom>
+        </p:spPr>
+        <p:txBody>
+          <a:bodyPr/>
+          <a:lstStyle/>
+          <a:p>
+            <a:pPr>
+              <a:lnSpc>
+                <a:spcPct val="90000"/>
+              </a:lnSpc>
+            </a:pPr>
+            <a:endParaRPr lang="en-US" dirty="0"/>
+          </a:p>
+          <a:p>
+            <a:pPr>
+              <a:lnSpc>
+                <a:spcPct val="90000"/>
+              </a:lnSpc>
+              <a:buFont typeface="Arial"/>
+              <a:buChar char="•"/>
+            </a:pPr>
+            <a:r>
+              <a:rPr lang="en-US" sz="2800" dirty="0" smtClean="0">
+                <a:latin typeface="Calibri" pitchFamily="34" charset="0"/>
+                <a:cs typeface="Calibri" pitchFamily="34" charset="0"/>
+              </a:rPr>
+              <a:t> The </a:t>
+            </a:r>
+            <a:r>
+              <a:rPr lang="en-US" sz="2800" dirty="0" err="1" smtClean="0">
+                <a:latin typeface="Calibri" pitchFamily="34" charset="0"/>
+                <a:cs typeface="Calibri" pitchFamily="34" charset="0"/>
+              </a:rPr>
+              <a:t>blockchain</a:t>
+            </a:r>
+            <a:r>
+              <a:rPr lang="en-US" sz="2800" dirty="0" smtClean="0">
+                <a:latin typeface="Calibri" pitchFamily="34" charset="0"/>
+                <a:cs typeface="Calibri" pitchFamily="34" charset="0"/>
+              </a:rPr>
+              <a:t> will find use in the area of driverless vehicles, using the technology to track the provenance of vehicles, and facilitate micropayments to own or rent the vehicles. </a:t>
+            </a:r>
+            <a:endParaRPr lang="en-US" sz="2800" dirty="0">
+              <a:latin typeface="Calibri" pitchFamily="34" charset="0"/>
+              <a:cs typeface="Calibri" pitchFamily="34" charset="0"/>
+            </a:endParaRPr>
+          </a:p>
+          <a:p>
+            <a:pPr>
+              <a:lnSpc>
+                <a:spcPct val="90000"/>
+              </a:lnSpc>
+              <a:buFont typeface="Arial"/>
+              <a:buChar char="•"/>
+            </a:pPr>
+            <a:endParaRPr lang="en-US" sz="2800" dirty="0" smtClean="0">
+              <a:latin typeface="Calibri" pitchFamily="34" charset="0"/>
+              <a:cs typeface="Calibri" pitchFamily="34" charset="0"/>
+            </a:endParaRPr>
+          </a:p>
+          <a:p>
+            <a:pPr>
+              <a:lnSpc>
+                <a:spcPct val="90000"/>
+              </a:lnSpc>
+              <a:buFont typeface="Arial"/>
+              <a:buChar char="•"/>
+            </a:pPr>
+            <a:r>
+              <a:rPr lang="en-US" sz="2800" dirty="0">
+                <a:latin typeface="Calibri" pitchFamily="34" charset="0"/>
+                <a:cs typeface="Calibri" pitchFamily="34" charset="0"/>
+              </a:rPr>
+              <a:t> </a:t>
+            </a:r>
+            <a:r>
+              <a:rPr lang="en-US" sz="2800" dirty="0" smtClean="0">
+                <a:latin typeface="Calibri" pitchFamily="34" charset="0"/>
+                <a:cs typeface="Calibri" pitchFamily="34" charset="0"/>
+              </a:rPr>
+              <a:t>The next decade will see increased penetration of this technology into the areas of supply chain management, secure ID’s (such as passports) and streamlining of government services. </a:t>
+            </a:r>
+          </a:p>
+          <a:p>
+            <a:pPr>
+              <a:lnSpc>
+                <a:spcPct val="90000"/>
+              </a:lnSpc>
+              <a:buFont typeface="Arial"/>
+              <a:buChar char="•"/>
+            </a:pPr>
+            <a:endParaRPr lang="en-US" sz="2800" dirty="0">
+              <a:latin typeface="Calibri" pitchFamily="34" charset="0"/>
+              <a:cs typeface="Calibri" pitchFamily="34" charset="0"/>
+            </a:endParaRPr>
+          </a:p>
+          <a:p>
+            <a:pPr>
+              <a:lnSpc>
+                <a:spcPct val="90000"/>
+              </a:lnSpc>
+              <a:buFont typeface="Arial"/>
+              <a:buChar char="•"/>
+            </a:pPr>
+            <a:r>
+              <a:rPr lang="en-US" sz="2800" dirty="0" smtClean="0">
+                <a:latin typeface="Calibri" pitchFamily="34" charset="0"/>
+                <a:cs typeface="Calibri" pitchFamily="34" charset="0"/>
+              </a:rPr>
+              <a:t>  There will be significant challenges for companies to find enough skilled engineers to implement these applications</a:t>
+            </a:r>
+            <a:r>
+              <a:rPr lang="en-US" sz="2800" smtClean="0">
+                <a:latin typeface="Calibri" pitchFamily="34" charset="0"/>
+                <a:cs typeface="Calibri" pitchFamily="34" charset="0"/>
+              </a:rPr>
+              <a:t>. </a:t>
+            </a:r>
+            <a:endParaRPr dirty="0"/>
+          </a:p>
+          <a:p>
+            <a:pPr>
+              <a:lnSpc>
+                <a:spcPct val="90000"/>
+              </a:lnSpc>
+            </a:pPr>
+            <a:endParaRPr dirty="0"/>
+          </a:p>
+        </p:txBody>
+      </p:sp>
+      <p:sp>
+        <p:nvSpPr>
+          <p:cNvPr id="105" name="TextShape 2"/>
+          <p:cNvSpPr txBox="1"/>
+          <p:nvPr/>
+        </p:nvSpPr>
+        <p:spPr>
+          <a:xfrm>
+            <a:off x="838080" y="192600"/>
+            <a:ext cx="10515240" cy="903600"/>
+          </a:xfrm>
+          <a:prstGeom prst="rect">
+            <a:avLst/>
+          </a:prstGeom>
+        </p:spPr>
+        <p:txBody>
+          <a:bodyPr anchor="ctr"/>
+          <a:lstStyle/>
+          <a:p>
+            <a:r>
+              <a:rPr lang="en-US" sz="4000" dirty="0" smtClean="0">
+                <a:solidFill>
+                  <a:srgbClr val="5B9BD5"/>
+                </a:solidFill>
+                <a:latin typeface="Calibri Light"/>
+              </a:rPr>
+              <a:t>Conclusions and Predictions</a:t>
+            </a:r>
+            <a:endParaRPr lang="en-US" sz="4000" dirty="0"/>
+          </a:p>
+        </p:txBody>
+      </p:sp>
+      <p:sp>
+        <p:nvSpPr>
+          <p:cNvPr id="107" name="TextShape 4"/>
+          <p:cNvSpPr txBox="1"/>
+          <p:nvPr/>
+        </p:nvSpPr>
+        <p:spPr>
+          <a:xfrm>
+            <a:off x="3957840" y="6319080"/>
+            <a:ext cx="4312440" cy="381240"/>
+          </a:xfrm>
+          <a:prstGeom prst="rect">
+            <a:avLst/>
+          </a:prstGeom>
+        </p:spPr>
+        <p:txBody>
+          <a:bodyPr anchor="ctr"/>
+          <a:lstStyle/>
+          <a:p>
+            <a:pPr>
+              <a:lnSpc>
+                <a:spcPct val="100000"/>
+              </a:lnSpc>
+            </a:pPr>
+            <a:r>
+              <a:rPr lang="en-IN" sz="1200">
+                <a:solidFill>
+                  <a:srgbClr val="8B8B8B"/>
+                </a:solidFill>
+                <a:latin typeface="Calibri"/>
+              </a:rPr>
+              <a:t>Python for Tool Developers</a:t>
+            </a:r>
+            <a:endParaRPr/>
+          </a:p>
+        </p:txBody>
+      </p:sp>
+      <p:sp>
+        <p:nvSpPr>
+          <p:cNvPr id="108" name="CustomShape 5"/>
+          <p:cNvSpPr/>
+          <p:nvPr/>
+        </p:nvSpPr>
+        <p:spPr>
+          <a:xfrm>
+            <a:off x="507960" y="6356520"/>
+            <a:ext cx="930960" cy="272880"/>
+          </a:xfrm>
+          <a:prstGeom prst="rect">
+            <a:avLst/>
+          </a:prstGeom>
+          <a:noFill/>
+          <a:ln>
+            <a:noFill/>
+          </a:ln>
+        </p:spPr>
+        <p:txBody>
+          <a:bodyPr lIns="90000" tIns="45000" rIns="90000" bIns="45000"/>
+          <a:lstStyle/>
+          <a:p>
+            <a:pPr>
+              <a:lnSpc>
+                <a:spcPct val="100000"/>
+              </a:lnSpc>
+            </a:pPr>
+            <a:fld id="{E062F212-EC51-4F87-B534-F3B507A69488}" type="slidenum">
+              <a:rPr lang="en-IN" sz="1200">
+                <a:solidFill>
+                  <a:srgbClr val="000000"/>
+                </a:solidFill>
+                <a:latin typeface="Calibri"/>
+              </a:rPr>
+              <a:t>41</a:t>
+            </a:fld>
+            <a:endParaRPr/>
+          </a:p>
+        </p:txBody>
+      </p:sp>
+    </p:spTree>
+    <p:extLst>
+      <p:ext uri="{BB962C8B-B14F-4D97-AF65-F5344CB8AC3E}">
+        <p14:creationId xmlns:p14="http://schemas.microsoft.com/office/powerpoint/2010/main" val="91348489"/>
+      </p:ext>
+    </p:extLst>
   </p:cSld>
   <p:clrMapOvr>
     <a:masterClrMapping/>

</xml_diff>